<commit_message>
starting to sync timer for the game
</commit_message>
<xml_diff>
--- a/Documentation/Using the QR Problem homework Site for Students.pptx
+++ b/Documentation/Using the QR Problem homework Site for Students.pptx
@@ -208,7 +208,7 @@
           <a:p>
             <a:fld id="{25E77101-5C26-4B11-93B2-79FA3FF3EC2B}" type="datetimeFigureOut">
               <a:rPr lang="en-US" smtClean="0"/>
-              <a:t>11/24/2018</a:t>
+              <a:t>1/9/2019</a:t>
             </a:fld>
             <a:endParaRPr lang="en-US"/>
           </a:p>
@@ -706,7 +706,7 @@
           <a:p>
             <a:fld id="{B5118C0B-F397-4327-82CB-A1E7667F62FD}" type="datetimeFigureOut">
               <a:rPr lang="en-US" smtClean="0"/>
-              <a:t>11/24/2018</a:t>
+              <a:t>1/9/2019</a:t>
             </a:fld>
             <a:endParaRPr lang="en-US"/>
           </a:p>
@@ -904,7 +904,7 @@
           <a:p>
             <a:fld id="{B5118C0B-F397-4327-82CB-A1E7667F62FD}" type="datetimeFigureOut">
               <a:rPr lang="en-US" smtClean="0"/>
-              <a:t>11/24/2018</a:t>
+              <a:t>1/9/2019</a:t>
             </a:fld>
             <a:endParaRPr lang="en-US"/>
           </a:p>
@@ -1112,7 +1112,7 @@
           <a:p>
             <a:fld id="{B5118C0B-F397-4327-82CB-A1E7667F62FD}" type="datetimeFigureOut">
               <a:rPr lang="en-US" smtClean="0"/>
-              <a:t>11/24/2018</a:t>
+              <a:t>1/9/2019</a:t>
             </a:fld>
             <a:endParaRPr lang="en-US"/>
           </a:p>
@@ -1310,7 +1310,7 @@
           <a:p>
             <a:fld id="{B5118C0B-F397-4327-82CB-A1E7667F62FD}" type="datetimeFigureOut">
               <a:rPr lang="en-US" smtClean="0"/>
-              <a:t>11/24/2018</a:t>
+              <a:t>1/9/2019</a:t>
             </a:fld>
             <a:endParaRPr lang="en-US"/>
           </a:p>
@@ -1585,7 +1585,7 @@
           <a:p>
             <a:fld id="{B5118C0B-F397-4327-82CB-A1E7667F62FD}" type="datetimeFigureOut">
               <a:rPr lang="en-US" smtClean="0"/>
-              <a:t>11/24/2018</a:t>
+              <a:t>1/9/2019</a:t>
             </a:fld>
             <a:endParaRPr lang="en-US"/>
           </a:p>
@@ -1850,7 +1850,7 @@
           <a:p>
             <a:fld id="{B5118C0B-F397-4327-82CB-A1E7667F62FD}" type="datetimeFigureOut">
               <a:rPr lang="en-US" smtClean="0"/>
-              <a:t>11/24/2018</a:t>
+              <a:t>1/9/2019</a:t>
             </a:fld>
             <a:endParaRPr lang="en-US"/>
           </a:p>
@@ -2262,7 +2262,7 @@
           <a:p>
             <a:fld id="{B5118C0B-F397-4327-82CB-A1E7667F62FD}" type="datetimeFigureOut">
               <a:rPr lang="en-US" smtClean="0"/>
-              <a:t>11/24/2018</a:t>
+              <a:t>1/9/2019</a:t>
             </a:fld>
             <a:endParaRPr lang="en-US"/>
           </a:p>
@@ -2403,7 +2403,7 @@
           <a:p>
             <a:fld id="{B5118C0B-F397-4327-82CB-A1E7667F62FD}" type="datetimeFigureOut">
               <a:rPr lang="en-US" smtClean="0"/>
-              <a:t>11/24/2018</a:t>
+              <a:t>1/9/2019</a:t>
             </a:fld>
             <a:endParaRPr lang="en-US"/>
           </a:p>
@@ -2516,7 +2516,7 @@
           <a:p>
             <a:fld id="{B5118C0B-F397-4327-82CB-A1E7667F62FD}" type="datetimeFigureOut">
               <a:rPr lang="en-US" smtClean="0"/>
-              <a:t>11/24/2018</a:t>
+              <a:t>1/9/2019</a:t>
             </a:fld>
             <a:endParaRPr lang="en-US"/>
           </a:p>
@@ -2827,7 +2827,7 @@
           <a:p>
             <a:fld id="{B5118C0B-F397-4327-82CB-A1E7667F62FD}" type="datetimeFigureOut">
               <a:rPr lang="en-US" smtClean="0"/>
-              <a:t>11/24/2018</a:t>
+              <a:t>1/9/2019</a:t>
             </a:fld>
             <a:endParaRPr lang="en-US"/>
           </a:p>
@@ -3115,7 +3115,7 @@
           <a:p>
             <a:fld id="{B5118C0B-F397-4327-82CB-A1E7667F62FD}" type="datetimeFigureOut">
               <a:rPr lang="en-US" smtClean="0"/>
-              <a:t>11/24/2018</a:t>
+              <a:t>1/9/2019</a:t>
             </a:fld>
             <a:endParaRPr lang="en-US"/>
           </a:p>
@@ -3356,7 +3356,7 @@
           <a:p>
             <a:fld id="{B5118C0B-F397-4327-82CB-A1E7667F62FD}" type="datetimeFigureOut">
               <a:rPr lang="en-US" smtClean="0"/>
-              <a:t>11/24/2018</a:t>
+              <a:t>1/9/2019</a:t>
             </a:fld>
             <a:endParaRPr lang="en-US"/>
           </a:p>
@@ -4092,23 +4092,7 @@
                   <a:srgbClr val="FF0000"/>
                 </a:solidFill>
               </a:rPr>
-              <a:t>QRProblems.org/</a:t>
-            </a:r>
-            <a:r>
-              <a:rPr lang="en-US" sz="4000" dirty="0" err="1">
-                <a:solidFill>
-                  <a:srgbClr val="FF0000"/>
-                </a:solidFill>
-              </a:rPr>
-              <a:t>hw</a:t>
-            </a:r>
-            <a:r>
-              <a:rPr lang="en-US" sz="4000" dirty="0">
-                <a:solidFill>
-                  <a:srgbClr val="FF0000"/>
-                </a:solidFill>
-              </a:rPr>
-              <a:t> </a:t>
+              <a:t>qrhomework.org </a:t>
             </a:r>
           </a:p>
           <a:p>
@@ -4258,10 +4242,10 @@
       </p:sp>
       <p:pic>
         <p:nvPicPr>
-          <p:cNvPr id="4" name="Content Placeholder 3">
-            <a:extLst>
-              <a:ext uri="{FF2B5EF4-FFF2-40B4-BE49-F238E27FC236}">
-                <a16:creationId xmlns:a16="http://schemas.microsoft.com/office/drawing/2014/main" id="{9BB6F923-D45D-477C-8A1B-74299B52360C}"/>
+          <p:cNvPr id="10" name="Content Placeholder 9">
+            <a:extLst>
+              <a:ext uri="{FF2B5EF4-FFF2-40B4-BE49-F238E27FC236}">
+                <a16:creationId xmlns:a16="http://schemas.microsoft.com/office/drawing/2014/main" id="{B2335A03-E9DE-456F-9143-707C4573C8BF}"/>
               </a:ext>
             </a:extLst>
           </p:cNvPr>
@@ -4280,196 +4264,14 @@
         </p:blipFill>
         <p:spPr>
           <a:xfrm>
-            <a:off x="450164" y="796854"/>
-            <a:ext cx="11037643" cy="5264291"/>
+            <a:off x="772886" y="861141"/>
+            <a:ext cx="9971314" cy="2912303"/>
           </a:xfrm>
           <a:prstGeom prst="rect">
             <a:avLst/>
           </a:prstGeom>
         </p:spPr>
       </p:pic>
-      <p:sp>
-        <p:nvSpPr>
-          <p:cNvPr id="5" name="Right Brace 4">
-            <a:extLst>
-              <a:ext uri="{FF2B5EF4-FFF2-40B4-BE49-F238E27FC236}">
-                <a16:creationId xmlns:a16="http://schemas.microsoft.com/office/drawing/2014/main" id="{C932153C-C39D-41E4-A7FD-3F1C02E15692}"/>
-              </a:ext>
-            </a:extLst>
-          </p:cNvPr>
-          <p:cNvSpPr/>
-          <p:nvPr/>
-        </p:nvSpPr>
-        <p:spPr>
-          <a:xfrm>
-            <a:off x="10131973" y="3636579"/>
-            <a:ext cx="443217" cy="1219200"/>
-          </a:xfrm>
-          <a:prstGeom prst="rightBrace">
-            <a:avLst>
-              <a:gd name="adj1" fmla="val 0"/>
-              <a:gd name="adj2" fmla="val 50862"/>
-            </a:avLst>
-          </a:prstGeom>
-          <a:ln>
-            <a:solidFill>
-              <a:srgbClr val="FF0000"/>
-            </a:solidFill>
-          </a:ln>
-        </p:spPr>
-        <p:style>
-          <a:lnRef idx="1">
-            <a:schemeClr val="accent1"/>
-          </a:lnRef>
-          <a:fillRef idx="0">
-            <a:schemeClr val="accent1"/>
-          </a:fillRef>
-          <a:effectRef idx="0">
-            <a:schemeClr val="accent1"/>
-          </a:effectRef>
-          <a:fontRef idx="minor">
-            <a:schemeClr val="tx1"/>
-          </a:fontRef>
-        </p:style>
-        <p:txBody>
-          <a:bodyPr rtlCol="0" anchor="ctr"/>
-          <a:lstStyle/>
-          <a:p>
-            <a:pPr algn="ctr"/>
-            <a:endParaRPr lang="en-US"/>
-          </a:p>
-        </p:txBody>
-      </p:sp>
-      <p:sp>
-        <p:nvSpPr>
-          <p:cNvPr id="6" name="TextBox 5">
-            <a:extLst>
-              <a:ext uri="{FF2B5EF4-FFF2-40B4-BE49-F238E27FC236}">
-                <a16:creationId xmlns:a16="http://schemas.microsoft.com/office/drawing/2014/main" id="{8D7F7A4F-1713-4E2F-9AA5-5844CE195331}"/>
-              </a:ext>
-            </a:extLst>
-          </p:cNvPr>
-          <p:cNvSpPr txBox="1"/>
-          <p:nvPr/>
-        </p:nvSpPr>
-        <p:spPr>
-          <a:xfrm>
-            <a:off x="10680293" y="3908378"/>
-            <a:ext cx="912617" cy="738664"/>
-          </a:xfrm>
-          <a:prstGeom prst="rect">
-            <a:avLst/>
-          </a:prstGeom>
-          <a:noFill/>
-        </p:spPr>
-        <p:txBody>
-          <a:bodyPr wrap="square" rtlCol="0">
-            <a:spAutoFit/>
-          </a:bodyPr>
-          <a:lstStyle/>
-          <a:p>
-            <a:r>
-              <a:rPr lang="en-US" sz="1400" dirty="0">
-                <a:solidFill>
-                  <a:srgbClr val="FF0000"/>
-                </a:solidFill>
-              </a:rPr>
-              <a:t>Your numerical problem</a:t>
-            </a:r>
-          </a:p>
-        </p:txBody>
-      </p:sp>
-      <p:sp>
-        <p:nvSpPr>
-          <p:cNvPr id="7" name="Right Brace 6">
-            <a:extLst>
-              <a:ext uri="{FF2B5EF4-FFF2-40B4-BE49-F238E27FC236}">
-                <a16:creationId xmlns:a16="http://schemas.microsoft.com/office/drawing/2014/main" id="{759EA4C0-FEB2-4F86-893B-8C4F9E6F0EC2}"/>
-              </a:ext>
-            </a:extLst>
-          </p:cNvPr>
-          <p:cNvSpPr/>
-          <p:nvPr/>
-        </p:nvSpPr>
-        <p:spPr>
-          <a:xfrm>
-            <a:off x="10131973" y="4957761"/>
-            <a:ext cx="443217" cy="1219200"/>
-          </a:xfrm>
-          <a:prstGeom prst="rightBrace">
-            <a:avLst>
-              <a:gd name="adj1" fmla="val 0"/>
-              <a:gd name="adj2" fmla="val 50862"/>
-            </a:avLst>
-          </a:prstGeom>
-          <a:ln>
-            <a:solidFill>
-              <a:srgbClr val="FF0000"/>
-            </a:solidFill>
-          </a:ln>
-        </p:spPr>
-        <p:style>
-          <a:lnRef idx="1">
-            <a:schemeClr val="accent1"/>
-          </a:lnRef>
-          <a:fillRef idx="0">
-            <a:schemeClr val="accent1"/>
-          </a:fillRef>
-          <a:effectRef idx="0">
-            <a:schemeClr val="accent1"/>
-          </a:effectRef>
-          <a:fontRef idx="minor">
-            <a:schemeClr val="tx1"/>
-          </a:fontRef>
-        </p:style>
-        <p:txBody>
-          <a:bodyPr rtlCol="0" anchor="ctr"/>
-          <a:lstStyle/>
-          <a:p>
-            <a:pPr algn="ctr"/>
-            <a:endParaRPr lang="en-US"/>
-          </a:p>
-        </p:txBody>
-      </p:sp>
-      <p:sp>
-        <p:nvSpPr>
-          <p:cNvPr id="8" name="TextBox 7">
-            <a:extLst>
-              <a:ext uri="{FF2B5EF4-FFF2-40B4-BE49-F238E27FC236}">
-                <a16:creationId xmlns:a16="http://schemas.microsoft.com/office/drawing/2014/main" id="{85C53425-BC22-4FFC-879C-59C371A73819}"/>
-              </a:ext>
-            </a:extLst>
-          </p:cNvPr>
-          <p:cNvSpPr txBox="1"/>
-          <p:nvPr/>
-        </p:nvSpPr>
-        <p:spPr>
-          <a:xfrm>
-            <a:off x="10680292" y="5198029"/>
-            <a:ext cx="912617" cy="738664"/>
-          </a:xfrm>
-          <a:prstGeom prst="rect">
-            <a:avLst/>
-          </a:prstGeom>
-          <a:noFill/>
-        </p:spPr>
-        <p:txBody>
-          <a:bodyPr wrap="square" rtlCol="0">
-            <a:spAutoFit/>
-          </a:bodyPr>
-          <a:lstStyle/>
-          <a:p>
-            <a:r>
-              <a:rPr lang="en-US" sz="1400" dirty="0">
-                <a:solidFill>
-                  <a:srgbClr val="FF0000"/>
-                </a:solidFill>
-              </a:rPr>
-              <a:t>Common Base-case problem</a:t>
-            </a:r>
-          </a:p>
-        </p:txBody>
-      </p:sp>
     </p:spTree>
     <p:extLst>
       <p:ext uri="{BB962C8B-B14F-4D97-AF65-F5344CB8AC3E}">
@@ -4896,8 +4698,8 @@
         </p:blipFill>
         <p:spPr>
           <a:xfrm>
-            <a:off x="834450" y="1281250"/>
-            <a:ext cx="4489681" cy="5000136"/>
+            <a:off x="834450" y="1235529"/>
+            <a:ext cx="4489681" cy="4668342"/>
           </a:xfrm>
           <a:prstGeom prst="rect">
             <a:avLst/>
@@ -4999,7 +4801,7 @@
         </p:nvSpPr>
         <p:spPr>
           <a:xfrm>
-            <a:off x="6011918" y="4126856"/>
+            <a:off x="6017361" y="3885740"/>
             <a:ext cx="4035972" cy="1569660"/>
           </a:xfrm>
           <a:prstGeom prst="rect">
@@ -5088,7 +4890,7 @@
         </p:nvCxnSpPr>
         <p:spPr>
           <a:xfrm rot="10800000" flipV="1">
-            <a:off x="4665765" y="5576750"/>
+            <a:off x="4665764" y="5236498"/>
             <a:ext cx="2202107" cy="477690"/>
           </a:xfrm>
           <a:prstGeom prst="bentConnector3">

</xml_diff>

<commit_message>
updating the powerpoint directions
</commit_message>
<xml_diff>
--- a/Documentation/Using the QR Problem homework Site for Students.pptx
+++ b/Documentation/Using the QR Problem homework Site for Students.pptx
@@ -126,6 +126,276 @@
 </p:presentation>
 </file>
 
+<file path=ppt/ink/ink1.xml><?xml version="1.0" encoding="utf-8"?>
+<inkml:ink xmlns:inkml="http://www.w3.org/2003/InkML">
+  <inkml:definitions>
+    <inkml:context xml:id="ctx0">
+      <inkml:inkSource xml:id="inkSrc0">
+        <inkml:traceFormat>
+          <inkml:channel name="X" type="integer" min="-2.14748E9" max="2.14748E9" units="cm"/>
+          <inkml:channel name="Y" type="integer" min="-2.14748E9" max="2.14748E9" units="cm"/>
+        </inkml:traceFormat>
+        <inkml:channelProperties>
+          <inkml:channelProperty channel="X" name="resolution" value="1000" units="1/cm"/>
+          <inkml:channelProperty channel="Y" name="resolution" value="1000" units="1/cm"/>
+        </inkml:channelProperties>
+      </inkml:inkSource>
+      <inkml:timestamp xml:id="ts0" timeString="2020-08-07T17:42:43.006"/>
+    </inkml:context>
+    <inkml:brush xml:id="br0">
+      <inkml:brushProperty name="width" value="0.05" units="cm"/>
+      <inkml:brushProperty name="height" value="0.05" units="cm"/>
+      <inkml:brushProperty name="color" value="#E71224"/>
+      <inkml:brushProperty name="ignorePressure" value="1"/>
+    </inkml:brush>
+  </inkml:definitions>
+  <inkml:trace contextRef="#ctx0" brushRef="#br0">9582 1447,'0'0,"0"-1,0 1,-1-1,1 1,0 0,0-1,-1 1,1-1,-1 1,1 0,0-1,-1 1,1 0,-1-1,1 1,-1 0,1 0,-1-1,1 1,-1 0,1 0,-1 0,1 0,-2-1,-16-2,16 3,-55-6,-83 4,79 2,14-1,-980 3,805 6,177-4,-1 3,-82 21,76-13,0-3,-1-2,-91 5,-568 2,-691-17,1020 24,2 34,50 14,-6 0,249-58,-168 6,-453-26,524 7,-222-3,320 0,1-5,-1-3,2-4,-120-35,-366-144,437 143,-72-27,-35-16,94 35,66 25,-105-61,164 80,-1-2,2 0,0-1,-19-22,36 35,0-1,0 0,0 0,1-1,0 1,0 0,0-1,1 0,0 0,0 0,0 0,1 0,-2-10,2-6,0 0,5-35,-1 5,-4-38,3-54,-1 134,1 1,0 0,0-1,1 1,0 0,1 0,0 0,0 1,1 0,10-15,-7 10,-1-1,0 0,-1 0,-1-1,5-22,5-10,-12 39,1 0,-1 0,2 0,-1 1,1-1,0 1,1 0,-1 1,1 0,1-1,-1 2,1-1,14-8,6-1,-1 2,52-17,11-6,-65 26,0 0,0 2,1 1,0 1,0 0,0 3,1 0,36 0,426 4,-202 0,3200-1,-1663 0,-1530-11,-7 1,1523 10,-1528 19,-61-2,-59-12,150 7,-78-6,109 10,-333-14,1 0,-1 0,0 1,1 0,-1 1,-1 0,11 6,55 41,-36-23,-28-20,-1 0,1 1,-1-1,-1 2,10 13,32 55,-37-57,113 205,-94-158,34 103,-59-146,-1 0,5 32,-10-44,0-1,-1 1,0 0,0-1,-2 1,-3 17,3-25,0 0,0 0,0 0,-1-1,1 1,-1-1,0 0,0 0,-1 0,1 0,-1-1,-8 7,-5 2,-35 18,32-19,-181 93,90-49,90-44,-120 55,122-59,0 0,0-2,-1 0,0-1,-31 3,29-5,0 1,-24 6,-19 3,-67 3,-159-3,-245-13,310 2,205-1</inkml:trace>
+</inkml:ink>
+</file>
+
+<file path=ppt/ink/ink10.xml><?xml version="1.0" encoding="utf-8"?>
+<inkml:ink xmlns:inkml="http://www.w3.org/2003/InkML">
+  <inkml:definitions>
+    <inkml:context xml:id="ctx0">
+      <inkml:inkSource xml:id="inkSrc0">
+        <inkml:traceFormat>
+          <inkml:channel name="X" type="integer" min="-2.14748E9" max="2.14748E9" units="cm"/>
+          <inkml:channel name="Y" type="integer" min="-2.14748E9" max="2.14748E9" units="cm"/>
+        </inkml:traceFormat>
+        <inkml:channelProperties>
+          <inkml:channelProperty channel="X" name="resolution" value="1000" units="1/cm"/>
+          <inkml:channelProperty channel="Y" name="resolution" value="1000" units="1/cm"/>
+        </inkml:channelProperties>
+      </inkml:inkSource>
+      <inkml:timestamp xml:id="ts0" timeString="2020-08-07T17:42:57.566"/>
+    </inkml:context>
+    <inkml:brush xml:id="br0">
+      <inkml:brushProperty name="width" value="0.05" units="cm"/>
+      <inkml:brushProperty name="height" value="0.05" units="cm"/>
+      <inkml:brushProperty name="color" value="#E71224"/>
+      <inkml:brushProperty name="ignorePressure" value="1"/>
+    </inkml:brush>
+  </inkml:definitions>
+  <inkml:trace contextRef="#ctx0" brushRef="#br0">1 9,'0'-4,"0"0</inkml:trace>
+</inkml:ink>
+</file>
+
+<file path=ppt/ink/ink2.xml><?xml version="1.0" encoding="utf-8"?>
+<inkml:ink xmlns:inkml="http://www.w3.org/2003/InkML">
+  <inkml:definitions>
+    <inkml:context xml:id="ctx0">
+      <inkml:inkSource xml:id="inkSrc0">
+        <inkml:traceFormat>
+          <inkml:channel name="X" type="integer" min="-2.14748E9" max="2.14748E9" units="cm"/>
+          <inkml:channel name="Y" type="integer" min="-2.14748E9" max="2.14748E9" units="cm"/>
+        </inkml:traceFormat>
+        <inkml:channelProperties>
+          <inkml:channelProperty channel="X" name="resolution" value="1000" units="1/cm"/>
+          <inkml:channelProperty channel="Y" name="resolution" value="1000" units="1/cm"/>
+        </inkml:channelProperties>
+      </inkml:inkSource>
+      <inkml:timestamp xml:id="ts0" timeString="2020-08-07T17:42:46.156"/>
+    </inkml:context>
+    <inkml:brush xml:id="br0">
+      <inkml:brushProperty name="width" value="0.05" units="cm"/>
+      <inkml:brushProperty name="height" value="0.05" units="cm"/>
+      <inkml:brushProperty name="color" value="#E71224"/>
+      <inkml:brushProperty name="ignorePressure" value="1"/>
+    </inkml:brush>
+  </inkml:definitions>
+  <inkml:trace contextRef="#ctx0" brushRef="#br0">1 8,'0'-3,"0"-2</inkml:trace>
+</inkml:ink>
+</file>
+
+<file path=ppt/ink/ink3.xml><?xml version="1.0" encoding="utf-8"?>
+<inkml:ink xmlns:inkml="http://www.w3.org/2003/InkML">
+  <inkml:definitions>
+    <inkml:context xml:id="ctx0">
+      <inkml:inkSource xml:id="inkSrc0">
+        <inkml:traceFormat>
+          <inkml:channel name="X" type="integer" min="-2.14748E9" max="2.14748E9" units="cm"/>
+          <inkml:channel name="Y" type="integer" min="-2.14748E9" max="2.14748E9" units="cm"/>
+        </inkml:traceFormat>
+        <inkml:channelProperties>
+          <inkml:channelProperty channel="X" name="resolution" value="1000" units="1/cm"/>
+          <inkml:channelProperty channel="Y" name="resolution" value="1000" units="1/cm"/>
+        </inkml:channelProperties>
+      </inkml:inkSource>
+      <inkml:timestamp xml:id="ts0" timeString="2020-08-07T17:42:47.238"/>
+    </inkml:context>
+    <inkml:brush xml:id="br0">
+      <inkml:brushProperty name="width" value="0.05" units="cm"/>
+      <inkml:brushProperty name="height" value="0.05" units="cm"/>
+      <inkml:brushProperty name="color" value="#E71224"/>
+      <inkml:brushProperty name="ignorePressure" value="1"/>
+    </inkml:brush>
+  </inkml:definitions>
+  <inkml:trace contextRef="#ctx0" brushRef="#br0">0 0</inkml:trace>
+</inkml:ink>
+</file>
+
+<file path=ppt/ink/ink4.xml><?xml version="1.0" encoding="utf-8"?>
+<inkml:ink xmlns:inkml="http://www.w3.org/2003/InkML">
+  <inkml:definitions>
+    <inkml:context xml:id="ctx0">
+      <inkml:inkSource xml:id="inkSrc0">
+        <inkml:traceFormat>
+          <inkml:channel name="X" type="integer" min="-2.14748E9" max="2.14748E9" units="cm"/>
+          <inkml:channel name="Y" type="integer" min="-2.14748E9" max="2.14748E9" units="cm"/>
+        </inkml:traceFormat>
+        <inkml:channelProperties>
+          <inkml:channelProperty channel="X" name="resolution" value="1000" units="1/cm"/>
+          <inkml:channelProperty channel="Y" name="resolution" value="1000" units="1/cm"/>
+        </inkml:channelProperties>
+      </inkml:inkSource>
+      <inkml:timestamp xml:id="ts0" timeString="2020-08-07T17:42:47.791"/>
+    </inkml:context>
+    <inkml:brush xml:id="br0">
+      <inkml:brushProperty name="width" value="0.05" units="cm"/>
+      <inkml:brushProperty name="height" value="0.05" units="cm"/>
+      <inkml:brushProperty name="color" value="#E71224"/>
+      <inkml:brushProperty name="ignorePressure" value="1"/>
+    </inkml:brush>
+  </inkml:definitions>
+  <inkml:trace contextRef="#ctx0" brushRef="#br0">1 1</inkml:trace>
+</inkml:ink>
+</file>
+
+<file path=ppt/ink/ink5.xml><?xml version="1.0" encoding="utf-8"?>
+<inkml:ink xmlns:inkml="http://www.w3.org/2003/InkML">
+  <inkml:definitions>
+    <inkml:context xml:id="ctx0">
+      <inkml:inkSource xml:id="inkSrc0">
+        <inkml:traceFormat>
+          <inkml:channel name="X" type="integer" min="-2.14748E9" max="2.14748E9" units="cm"/>
+          <inkml:channel name="Y" type="integer" min="-2.14748E9" max="2.14748E9" units="cm"/>
+        </inkml:traceFormat>
+        <inkml:channelProperties>
+          <inkml:channelProperty channel="X" name="resolution" value="1000" units="1/cm"/>
+          <inkml:channelProperty channel="Y" name="resolution" value="1000" units="1/cm"/>
+        </inkml:channelProperties>
+      </inkml:inkSource>
+      <inkml:timestamp xml:id="ts0" timeString="2020-08-07T17:42:48.689"/>
+    </inkml:context>
+    <inkml:brush xml:id="br0">
+      <inkml:brushProperty name="width" value="0.05" units="cm"/>
+      <inkml:brushProperty name="height" value="0.05" units="cm"/>
+      <inkml:brushProperty name="color" value="#E71224"/>
+      <inkml:brushProperty name="ignorePressure" value="1"/>
+    </inkml:brush>
+  </inkml:definitions>
+  <inkml:trace contextRef="#ctx0" brushRef="#br0">0 8,'0'-3,"0"-1</inkml:trace>
+</inkml:ink>
+</file>
+
+<file path=ppt/ink/ink6.xml><?xml version="1.0" encoding="utf-8"?>
+<inkml:ink xmlns:inkml="http://www.w3.org/2003/InkML">
+  <inkml:definitions>
+    <inkml:context xml:id="ctx0">
+      <inkml:inkSource xml:id="inkSrc0">
+        <inkml:traceFormat>
+          <inkml:channel name="X" type="integer" min="-2.14748E9" max="2.14748E9" units="cm"/>
+          <inkml:channel name="Y" type="integer" min="-2.14748E9" max="2.14748E9" units="cm"/>
+        </inkml:traceFormat>
+        <inkml:channelProperties>
+          <inkml:channelProperty channel="X" name="resolution" value="1000" units="1/cm"/>
+          <inkml:channelProperty channel="Y" name="resolution" value="1000" units="1/cm"/>
+        </inkml:channelProperties>
+      </inkml:inkSource>
+      <inkml:timestamp xml:id="ts0" timeString="2020-08-07T17:42:51.526"/>
+    </inkml:context>
+    <inkml:brush xml:id="br0">
+      <inkml:brushProperty name="width" value="0.05" units="cm"/>
+      <inkml:brushProperty name="height" value="0.05" units="cm"/>
+      <inkml:brushProperty name="color" value="#E71224"/>
+      <inkml:brushProperty name="ignorePressure" value="1"/>
+    </inkml:brush>
+  </inkml:definitions>
+  <inkml:trace contextRef="#ctx0" brushRef="#br0">0 20,'0'-3,"0"-5,0 0</inkml:trace>
+</inkml:ink>
+</file>
+
+<file path=ppt/ink/ink7.xml><?xml version="1.0" encoding="utf-8"?>
+<inkml:ink xmlns:inkml="http://www.w3.org/2003/InkML">
+  <inkml:definitions>
+    <inkml:context xml:id="ctx0">
+      <inkml:inkSource xml:id="inkSrc0">
+        <inkml:traceFormat>
+          <inkml:channel name="X" type="integer" min="-2.14748E9" max="2.14748E9" units="cm"/>
+          <inkml:channel name="Y" type="integer" min="-2.14748E9" max="2.14748E9" units="cm"/>
+        </inkml:traceFormat>
+        <inkml:channelProperties>
+          <inkml:channelProperty channel="X" name="resolution" value="1000" units="1/cm"/>
+          <inkml:channelProperty channel="Y" name="resolution" value="1000" units="1/cm"/>
+        </inkml:channelProperties>
+      </inkml:inkSource>
+      <inkml:timestamp xml:id="ts0" timeString="2020-08-07T17:42:52.359"/>
+    </inkml:context>
+    <inkml:brush xml:id="br0">
+      <inkml:brushProperty name="width" value="0.05" units="cm"/>
+      <inkml:brushProperty name="height" value="0.05" units="cm"/>
+      <inkml:brushProperty name="color" value="#E71224"/>
+      <inkml:brushProperty name="ignorePressure" value="1"/>
+    </inkml:brush>
+  </inkml:definitions>
+  <inkml:trace contextRef="#ctx0" brushRef="#br0">17 12,'0'-3,"-7"-1,-2 0</inkml:trace>
+</inkml:ink>
+</file>
+
+<file path=ppt/ink/ink8.xml><?xml version="1.0" encoding="utf-8"?>
+<inkml:ink xmlns:inkml="http://www.w3.org/2003/InkML">
+  <inkml:definitions>
+    <inkml:context xml:id="ctx0">
+      <inkml:inkSource xml:id="inkSrc0">
+        <inkml:traceFormat>
+          <inkml:channel name="X" type="integer" min="-2.14748E9" max="2.14748E9" units="cm"/>
+          <inkml:channel name="Y" type="integer" min="-2.14748E9" max="2.14748E9" units="cm"/>
+        </inkml:traceFormat>
+        <inkml:channelProperties>
+          <inkml:channelProperty channel="X" name="resolution" value="1000" units="1/cm"/>
+          <inkml:channelProperty channel="Y" name="resolution" value="1000" units="1/cm"/>
+        </inkml:channelProperties>
+      </inkml:inkSource>
+      <inkml:timestamp xml:id="ts0" timeString="2020-08-07T17:42:53.508"/>
+    </inkml:context>
+    <inkml:brush xml:id="br0">
+      <inkml:brushProperty name="width" value="0.05" units="cm"/>
+      <inkml:brushProperty name="height" value="0.05" units="cm"/>
+      <inkml:brushProperty name="color" value="#E71224"/>
+      <inkml:brushProperty name="ignorePressure" value="1"/>
+    </inkml:brush>
+  </inkml:definitions>
+  <inkml:trace contextRef="#ctx0" brushRef="#br0">1 1</inkml:trace>
+</inkml:ink>
+</file>
+
+<file path=ppt/ink/ink9.xml><?xml version="1.0" encoding="utf-8"?>
+<inkml:ink xmlns:inkml="http://www.w3.org/2003/InkML">
+  <inkml:definitions>
+    <inkml:context xml:id="ctx0">
+      <inkml:inkSource xml:id="inkSrc0">
+        <inkml:traceFormat>
+          <inkml:channel name="X" type="integer" min="-2.14748E9" max="2.14748E9" units="cm"/>
+          <inkml:channel name="Y" type="integer" min="-2.14748E9" max="2.14748E9" units="cm"/>
+        </inkml:traceFormat>
+        <inkml:channelProperties>
+          <inkml:channelProperty channel="X" name="resolution" value="1000" units="1/cm"/>
+          <inkml:channelProperty channel="Y" name="resolution" value="1000" units="1/cm"/>
+        </inkml:channelProperties>
+      </inkml:inkSource>
+      <inkml:timestamp xml:id="ts0" timeString="2020-08-07T17:42:56.683"/>
+    </inkml:context>
+    <inkml:brush xml:id="br0">
+      <inkml:brushProperty name="width" value="0.05" units="cm"/>
+      <inkml:brushProperty name="height" value="0.05" units="cm"/>
+      <inkml:brushProperty name="color" value="#E71224"/>
+      <inkml:brushProperty name="ignorePressure" value="1"/>
+    </inkml:brush>
+  </inkml:definitions>
+  <inkml:trace contextRef="#ctx0" brushRef="#br0">12 1,'-3'0,"-2"3,1 1</inkml:trace>
+</inkml:ink>
+</file>
+
 <file path=ppt/notesMasters/notesMaster1.xml><?xml version="1.0" encoding="utf-8"?>
 <p:notesMaster xmlns:a="http://schemas.openxmlformats.org/drawingml/2006/main" xmlns:r="http://schemas.openxmlformats.org/officeDocument/2006/relationships" xmlns:p="http://schemas.openxmlformats.org/presentationml/2006/main">
   <p:cSld>
@@ -208,7 +478,7 @@
           <a:p>
             <a:fld id="{25E77101-5C26-4B11-93B2-79FA3FF3EC2B}" type="datetimeFigureOut">
               <a:rPr lang="en-US" smtClean="0"/>
-              <a:t>1/9/2019</a:t>
+              <a:t>8/7/2020</a:t>
             </a:fld>
             <a:endParaRPr lang="en-US"/>
           </a:p>
@@ -706,7 +976,7 @@
           <a:p>
             <a:fld id="{B5118C0B-F397-4327-82CB-A1E7667F62FD}" type="datetimeFigureOut">
               <a:rPr lang="en-US" smtClean="0"/>
-              <a:t>1/9/2019</a:t>
+              <a:t>8/7/2020</a:t>
             </a:fld>
             <a:endParaRPr lang="en-US"/>
           </a:p>
@@ -904,7 +1174,7 @@
           <a:p>
             <a:fld id="{B5118C0B-F397-4327-82CB-A1E7667F62FD}" type="datetimeFigureOut">
               <a:rPr lang="en-US" smtClean="0"/>
-              <a:t>1/9/2019</a:t>
+              <a:t>8/7/2020</a:t>
             </a:fld>
             <a:endParaRPr lang="en-US"/>
           </a:p>
@@ -1112,7 +1382,7 @@
           <a:p>
             <a:fld id="{B5118C0B-F397-4327-82CB-A1E7667F62FD}" type="datetimeFigureOut">
               <a:rPr lang="en-US" smtClean="0"/>
-              <a:t>1/9/2019</a:t>
+              <a:t>8/7/2020</a:t>
             </a:fld>
             <a:endParaRPr lang="en-US"/>
           </a:p>
@@ -1310,7 +1580,7 @@
           <a:p>
             <a:fld id="{B5118C0B-F397-4327-82CB-A1E7667F62FD}" type="datetimeFigureOut">
               <a:rPr lang="en-US" smtClean="0"/>
-              <a:t>1/9/2019</a:t>
+              <a:t>8/7/2020</a:t>
             </a:fld>
             <a:endParaRPr lang="en-US"/>
           </a:p>
@@ -1585,7 +1855,7 @@
           <a:p>
             <a:fld id="{B5118C0B-F397-4327-82CB-A1E7667F62FD}" type="datetimeFigureOut">
               <a:rPr lang="en-US" smtClean="0"/>
-              <a:t>1/9/2019</a:t>
+              <a:t>8/7/2020</a:t>
             </a:fld>
             <a:endParaRPr lang="en-US"/>
           </a:p>
@@ -1850,7 +2120,7 @@
           <a:p>
             <a:fld id="{B5118C0B-F397-4327-82CB-A1E7667F62FD}" type="datetimeFigureOut">
               <a:rPr lang="en-US" smtClean="0"/>
-              <a:t>1/9/2019</a:t>
+              <a:t>8/7/2020</a:t>
             </a:fld>
             <a:endParaRPr lang="en-US"/>
           </a:p>
@@ -2262,7 +2532,7 @@
           <a:p>
             <a:fld id="{B5118C0B-F397-4327-82CB-A1E7667F62FD}" type="datetimeFigureOut">
               <a:rPr lang="en-US" smtClean="0"/>
-              <a:t>1/9/2019</a:t>
+              <a:t>8/7/2020</a:t>
             </a:fld>
             <a:endParaRPr lang="en-US"/>
           </a:p>
@@ -2403,7 +2673,7 @@
           <a:p>
             <a:fld id="{B5118C0B-F397-4327-82CB-A1E7667F62FD}" type="datetimeFigureOut">
               <a:rPr lang="en-US" smtClean="0"/>
-              <a:t>1/9/2019</a:t>
+              <a:t>8/7/2020</a:t>
             </a:fld>
             <a:endParaRPr lang="en-US"/>
           </a:p>
@@ -2516,7 +2786,7 @@
           <a:p>
             <a:fld id="{B5118C0B-F397-4327-82CB-A1E7667F62FD}" type="datetimeFigureOut">
               <a:rPr lang="en-US" smtClean="0"/>
-              <a:t>1/9/2019</a:t>
+              <a:t>8/7/2020</a:t>
             </a:fld>
             <a:endParaRPr lang="en-US"/>
           </a:p>
@@ -2827,7 +3097,7 @@
           <a:p>
             <a:fld id="{B5118C0B-F397-4327-82CB-A1E7667F62FD}" type="datetimeFigureOut">
               <a:rPr lang="en-US" smtClean="0"/>
-              <a:t>1/9/2019</a:t>
+              <a:t>8/7/2020</a:t>
             </a:fld>
             <a:endParaRPr lang="en-US"/>
           </a:p>
@@ -3115,7 +3385,7 @@
           <a:p>
             <a:fld id="{B5118C0B-F397-4327-82CB-A1E7667F62FD}" type="datetimeFigureOut">
               <a:rPr lang="en-US" smtClean="0"/>
-              <a:t>1/9/2019</a:t>
+              <a:t>8/7/2020</a:t>
             </a:fld>
             <a:endParaRPr lang="en-US"/>
           </a:p>
@@ -3356,7 +3626,7 @@
           <a:p>
             <a:fld id="{B5118C0B-F397-4327-82CB-A1E7667F62FD}" type="datetimeFigureOut">
               <a:rPr lang="en-US" smtClean="0"/>
-              <a:t>1/9/2019</a:t>
+              <a:t>8/7/2020</a:t>
             </a:fld>
             <a:endParaRPr lang="en-US"/>
           </a:p>
@@ -3881,26 +4151,56 @@
           <a:chExt cx="0" cy="0"/>
         </a:xfrm>
       </p:grpSpPr>
-      <p:sp>
-        <p:nvSpPr>
-          <p:cNvPr id="2" name="Title 1">
-            <a:extLst>
-              <a:ext uri="{FF2B5EF4-FFF2-40B4-BE49-F238E27FC236}">
-                <a16:creationId xmlns:a16="http://schemas.microsoft.com/office/drawing/2014/main" id="{849D037E-2CDE-48AD-A79D-1EB2C651B122}"/>
-              </a:ext>
-            </a:extLst>
-          </p:cNvPr>
-          <p:cNvSpPr>
-            <a:spLocks noGrp="1"/>
-          </p:cNvSpPr>
-          <p:nvPr>
-            <p:ph type="title"/>
-          </p:nvPr>
-        </p:nvSpPr>
+      <p:pic>
+        <p:nvPicPr>
+          <p:cNvPr id="5" name="Picture 4">
+            <a:extLst>
+              <a:ext uri="{FF2B5EF4-FFF2-40B4-BE49-F238E27FC236}">
+                <a16:creationId xmlns:a16="http://schemas.microsoft.com/office/drawing/2014/main" id="{8838E58E-D30F-4B84-94A9-22EA4A0CD2C2}"/>
+              </a:ext>
+            </a:extLst>
+          </p:cNvPr>
+          <p:cNvPicPr>
+            <a:picLocks noChangeAspect="1"/>
+          </p:cNvPicPr>
+          <p:nvPr/>
+        </p:nvPicPr>
+        <p:blipFill>
+          <a:blip r:embed="rId4"/>
+          <a:stretch>
+            <a:fillRect/>
+          </a:stretch>
+        </p:blipFill>
         <p:spPr>
           <a:xfrm>
-            <a:off x="1107141" y="938866"/>
-            <a:ext cx="10515600" cy="1325563"/>
+            <a:off x="6455793" y="511444"/>
+            <a:ext cx="4764979" cy="5470902"/>
+          </a:xfrm>
+          <a:prstGeom prst="rect">
+            <a:avLst/>
+          </a:prstGeom>
+        </p:spPr>
+      </p:pic>
+      <p:sp>
+        <p:nvSpPr>
+          <p:cNvPr id="2" name="Title 1">
+            <a:extLst>
+              <a:ext uri="{FF2B5EF4-FFF2-40B4-BE49-F238E27FC236}">
+                <a16:creationId xmlns:a16="http://schemas.microsoft.com/office/drawing/2014/main" id="{849D037E-2CDE-48AD-A79D-1EB2C651B122}"/>
+              </a:ext>
+            </a:extLst>
+          </p:cNvPr>
+          <p:cNvSpPr>
+            <a:spLocks noGrp="1"/>
+          </p:cNvSpPr>
+          <p:nvPr>
+            <p:ph type="title"/>
+          </p:nvPr>
+        </p:nvSpPr>
+        <p:spPr>
+          <a:xfrm>
+            <a:off x="777438" y="488385"/>
+            <a:ext cx="5745480" cy="1325563"/>
           </a:xfrm>
         </p:spPr>
         <p:txBody>
@@ -3914,82 +4214,565 @@
                 <a:latin typeface="Times New Roman" panose="02020603050405020304" pitchFamily="18" charset="0"/>
                 <a:cs typeface="Times New Roman" panose="02020603050405020304" pitchFamily="18" charset="0"/>
               </a:rPr>
-              <a:t>Your instructor should have assigned you a problem number and PIN</a:t>
-            </a:r>
-          </a:p>
-        </p:txBody>
-      </p:sp>
-      <p:sp>
-        <p:nvSpPr>
-          <p:cNvPr id="3" name="Content Placeholder 2">
-            <a:extLst>
-              <a:ext uri="{FF2B5EF4-FFF2-40B4-BE49-F238E27FC236}">
-                <a16:creationId xmlns:a16="http://schemas.microsoft.com/office/drawing/2014/main" id="{F88529B1-8DC6-46B7-A07D-D4AD21667E3C}"/>
-              </a:ext>
-            </a:extLst>
-          </p:cNvPr>
-          <p:cNvSpPr>
-            <a:spLocks noGrp="1"/>
-          </p:cNvSpPr>
-          <p:nvPr>
-            <p:ph idx="1"/>
-          </p:nvPr>
-        </p:nvSpPr>
-        <p:spPr>
-          <a:xfrm>
-            <a:off x="838200" y="3582708"/>
-            <a:ext cx="10515600" cy="2782234"/>
-          </a:xfrm>
-        </p:spPr>
-        <p:txBody>
-          <a:bodyPr>
-            <a:normAutofit lnSpcReduction="10000"/>
-          </a:bodyPr>
-          <a:lstStyle/>
-          <a:p>
-            <a:r>
-              <a:rPr lang="en-US" sz="6000" dirty="0"/>
-              <a:t>Lets Suppose the </a:t>
-            </a:r>
-          </a:p>
-          <a:p>
-            <a:r>
-              <a:rPr lang="en-US" sz="6000" dirty="0"/>
-              <a:t>Problem number is 175 </a:t>
-            </a:r>
-          </a:p>
-          <a:p>
-            <a:r>
-              <a:rPr lang="en-US" sz="6000" dirty="0"/>
-              <a:t>and your PIN is 32.  </a:t>
-            </a:r>
-          </a:p>
-        </p:txBody>
-      </p:sp>
+              <a:t>Go to </a:t>
+            </a:r>
+            <a:r>
+              <a:rPr lang="en-US" sz="6000" dirty="0">
+                <a:solidFill>
+                  <a:srgbClr val="FF0000"/>
+                </a:solidFill>
+                <a:latin typeface="Times New Roman" panose="02020603050405020304" pitchFamily="18" charset="0"/>
+                <a:cs typeface="Times New Roman" panose="02020603050405020304" pitchFamily="18" charset="0"/>
+              </a:rPr>
+              <a:t>QRhomework.org</a:t>
+            </a:r>
+          </a:p>
+        </p:txBody>
+      </p:sp>
+      <mc:AlternateContent xmlns:mc="http://schemas.openxmlformats.org/markup-compatibility/2006">
+        <mc:Choice xmlns:p14="http://schemas.microsoft.com/office/powerpoint/2010/main" Requires="p14">
+          <p:contentPart p14:bwMode="auto" r:id="rId5">
+            <p14:nvContentPartPr>
+              <p14:cNvPr id="8" name="Ink 7">
+                <a:extLst>
+                  <a:ext uri="{FF2B5EF4-FFF2-40B4-BE49-F238E27FC236}">
+                    <a16:creationId xmlns:a16="http://schemas.microsoft.com/office/drawing/2014/main" id="{90120B58-78F4-4EA5-9984-2EEC2272389D}"/>
+                  </a:ext>
+                </a:extLst>
+              </p14:cNvPr>
+              <p14:cNvContentPartPr/>
+              <p14:nvPr/>
+            </p14:nvContentPartPr>
+            <p14:xfrm>
+              <a:off x="6242898" y="5541729"/>
+              <a:ext cx="4057200" cy="649800"/>
+            </p14:xfrm>
+          </p:contentPart>
+        </mc:Choice>
+        <mc:Fallback>
+          <p:pic>
+            <p:nvPicPr>
+              <p:cNvPr id="8" name="Ink 7">
+                <a:extLst>
+                  <a:ext uri="{FF2B5EF4-FFF2-40B4-BE49-F238E27FC236}">
+                    <a16:creationId xmlns:a16="http://schemas.microsoft.com/office/drawing/2014/main" id="{90120B58-78F4-4EA5-9984-2EEC2272389D}"/>
+                  </a:ext>
+                </a:extLst>
+              </p:cNvPr>
+              <p:cNvPicPr/>
+              <p:nvPr/>
+            </p:nvPicPr>
+            <p:blipFill>
+              <a:blip r:embed="rId6"/>
+              <a:stretch>
+                <a:fillRect/>
+              </a:stretch>
+            </p:blipFill>
+            <p:spPr>
+              <a:xfrm>
+                <a:off x="6233898" y="5533089"/>
+                <a:ext cx="4074840" cy="667440"/>
+              </a:xfrm>
+              <a:prstGeom prst="rect">
+                <a:avLst/>
+              </a:prstGeom>
+            </p:spPr>
+          </p:pic>
+        </mc:Fallback>
+      </mc:AlternateContent>
+      <mc:AlternateContent xmlns:mc="http://schemas.openxmlformats.org/markup-compatibility/2006">
+        <mc:Choice xmlns:p14="http://schemas.microsoft.com/office/powerpoint/2010/main" Requires="p14">
+          <p:contentPart p14:bwMode="auto" r:id="rId7">
+            <p14:nvContentPartPr>
+              <p14:cNvPr id="9" name="Ink 8">
+                <a:extLst>
+                  <a:ext uri="{FF2B5EF4-FFF2-40B4-BE49-F238E27FC236}">
+                    <a16:creationId xmlns:a16="http://schemas.microsoft.com/office/drawing/2014/main" id="{B62D181B-59CB-4CB6-9F90-DB36A50E33B8}"/>
+                  </a:ext>
+                </a:extLst>
+              </p14:cNvPr>
+              <p14:cNvContentPartPr/>
+              <p14:nvPr/>
+            </p14:nvContentPartPr>
+            <p14:xfrm>
+              <a:off x="2524458" y="2845689"/>
+              <a:ext cx="360" cy="3240"/>
+            </p14:xfrm>
+          </p:contentPart>
+        </mc:Choice>
+        <mc:Fallback>
+          <p:pic>
+            <p:nvPicPr>
+              <p:cNvPr id="9" name="Ink 8">
+                <a:extLst>
+                  <a:ext uri="{FF2B5EF4-FFF2-40B4-BE49-F238E27FC236}">
+                    <a16:creationId xmlns:a16="http://schemas.microsoft.com/office/drawing/2014/main" id="{B62D181B-59CB-4CB6-9F90-DB36A50E33B8}"/>
+                  </a:ext>
+                </a:extLst>
+              </p:cNvPr>
+              <p:cNvPicPr/>
+              <p:nvPr/>
+            </p:nvPicPr>
+            <p:blipFill>
+              <a:blip r:embed="rId8"/>
+              <a:stretch>
+                <a:fillRect/>
+              </a:stretch>
+            </p:blipFill>
+            <p:spPr>
+              <a:xfrm>
+                <a:off x="2515818" y="2836689"/>
+                <a:ext cx="18000" cy="20880"/>
+              </a:xfrm>
+              <a:prstGeom prst="rect">
+                <a:avLst/>
+              </a:prstGeom>
+            </p:spPr>
+          </p:pic>
+        </mc:Fallback>
+      </mc:AlternateContent>
+      <mc:AlternateContent xmlns:mc="http://schemas.openxmlformats.org/markup-compatibility/2006">
+        <mc:Choice xmlns:p14="http://schemas.microsoft.com/office/powerpoint/2010/main" Requires="p14">
+          <p:contentPart p14:bwMode="auto" r:id="rId9">
+            <p14:nvContentPartPr>
+              <p14:cNvPr id="10" name="Ink 9">
+                <a:extLst>
+                  <a:ext uri="{FF2B5EF4-FFF2-40B4-BE49-F238E27FC236}">
+                    <a16:creationId xmlns:a16="http://schemas.microsoft.com/office/drawing/2014/main" id="{CFAE2E7C-FA1E-46C6-ADEC-97CF68ECE8C8}"/>
+                  </a:ext>
+                </a:extLst>
+              </p14:cNvPr>
+              <p14:cNvContentPartPr/>
+              <p14:nvPr/>
+            </p14:nvContentPartPr>
+            <p14:xfrm>
+              <a:off x="1934058" y="2553009"/>
+              <a:ext cx="360" cy="360"/>
+            </p14:xfrm>
+          </p:contentPart>
+        </mc:Choice>
+        <mc:Fallback>
+          <p:pic>
+            <p:nvPicPr>
+              <p:cNvPr id="10" name="Ink 9">
+                <a:extLst>
+                  <a:ext uri="{FF2B5EF4-FFF2-40B4-BE49-F238E27FC236}">
+                    <a16:creationId xmlns:a16="http://schemas.microsoft.com/office/drawing/2014/main" id="{CFAE2E7C-FA1E-46C6-ADEC-97CF68ECE8C8}"/>
+                  </a:ext>
+                </a:extLst>
+              </p:cNvPr>
+              <p:cNvPicPr/>
+              <p:nvPr/>
+            </p:nvPicPr>
+            <p:blipFill>
+              <a:blip r:embed="rId10"/>
+              <a:stretch>
+                <a:fillRect/>
+              </a:stretch>
+            </p:blipFill>
+            <p:spPr>
+              <a:xfrm>
+                <a:off x="1925058" y="2544009"/>
+                <a:ext cx="18000" cy="18000"/>
+              </a:xfrm>
+              <a:prstGeom prst="rect">
+                <a:avLst/>
+              </a:prstGeom>
+            </p:spPr>
+          </p:pic>
+        </mc:Fallback>
+      </mc:AlternateContent>
+      <mc:AlternateContent xmlns:mc="http://schemas.openxmlformats.org/markup-compatibility/2006">
+        <mc:Choice xmlns:p14="http://schemas.microsoft.com/office/powerpoint/2010/main" Requires="p14">
+          <p:contentPart p14:bwMode="auto" r:id="rId11">
+            <p14:nvContentPartPr>
+              <p14:cNvPr id="11" name="Ink 10">
+                <a:extLst>
+                  <a:ext uri="{FF2B5EF4-FFF2-40B4-BE49-F238E27FC236}">
+                    <a16:creationId xmlns:a16="http://schemas.microsoft.com/office/drawing/2014/main" id="{8EDB6EB5-13AE-48DC-9027-6E775CC74803}"/>
+                  </a:ext>
+                </a:extLst>
+              </p14:cNvPr>
+              <p14:cNvContentPartPr/>
+              <p14:nvPr/>
+            </p14:nvContentPartPr>
+            <p14:xfrm>
+              <a:off x="2088498" y="2383809"/>
+              <a:ext cx="360" cy="360"/>
+            </p14:xfrm>
+          </p:contentPart>
+        </mc:Choice>
+        <mc:Fallback>
+          <p:pic>
+            <p:nvPicPr>
+              <p:cNvPr id="11" name="Ink 10">
+                <a:extLst>
+                  <a:ext uri="{FF2B5EF4-FFF2-40B4-BE49-F238E27FC236}">
+                    <a16:creationId xmlns:a16="http://schemas.microsoft.com/office/drawing/2014/main" id="{8EDB6EB5-13AE-48DC-9027-6E775CC74803}"/>
+                  </a:ext>
+                </a:extLst>
+              </p:cNvPr>
+              <p:cNvPicPr/>
+              <p:nvPr/>
+            </p:nvPicPr>
+            <p:blipFill>
+              <a:blip r:embed="rId10"/>
+              <a:stretch>
+                <a:fillRect/>
+              </a:stretch>
+            </p:blipFill>
+            <p:spPr>
+              <a:xfrm>
+                <a:off x="2079858" y="2375169"/>
+                <a:ext cx="18000" cy="18000"/>
+              </a:xfrm>
+              <a:prstGeom prst="rect">
+                <a:avLst/>
+              </a:prstGeom>
+            </p:spPr>
+          </p:pic>
+        </mc:Fallback>
+      </mc:AlternateContent>
+      <mc:AlternateContent xmlns:mc="http://schemas.openxmlformats.org/markup-compatibility/2006">
+        <mc:Choice xmlns:p14="http://schemas.microsoft.com/office/powerpoint/2010/main" Requires="p14">
+          <p:contentPart p14:bwMode="auto" r:id="rId12">
+            <p14:nvContentPartPr>
+              <p14:cNvPr id="12" name="Ink 11">
+                <a:extLst>
+                  <a:ext uri="{FF2B5EF4-FFF2-40B4-BE49-F238E27FC236}">
+                    <a16:creationId xmlns:a16="http://schemas.microsoft.com/office/drawing/2014/main" id="{489DD33F-8EE7-4717-8374-1DC967B6DD44}"/>
+                  </a:ext>
+                </a:extLst>
+              </p14:cNvPr>
+              <p14:cNvContentPartPr/>
+              <p14:nvPr/>
+            </p14:nvContentPartPr>
+            <p14:xfrm>
+              <a:off x="3664218" y="4744329"/>
+              <a:ext cx="360" cy="3240"/>
+            </p14:xfrm>
+          </p:contentPart>
+        </mc:Choice>
+        <mc:Fallback>
+          <p:pic>
+            <p:nvPicPr>
+              <p:cNvPr id="12" name="Ink 11">
+                <a:extLst>
+                  <a:ext uri="{FF2B5EF4-FFF2-40B4-BE49-F238E27FC236}">
+                    <a16:creationId xmlns:a16="http://schemas.microsoft.com/office/drawing/2014/main" id="{489DD33F-8EE7-4717-8374-1DC967B6DD44}"/>
+                  </a:ext>
+                </a:extLst>
+              </p:cNvPr>
+              <p:cNvPicPr/>
+              <p:nvPr/>
+            </p:nvPicPr>
+            <p:blipFill>
+              <a:blip r:embed="rId8"/>
+              <a:stretch>
+                <a:fillRect/>
+              </a:stretch>
+            </p:blipFill>
+            <p:spPr>
+              <a:xfrm>
+                <a:off x="3655218" y="4735689"/>
+                <a:ext cx="18000" cy="20880"/>
+              </a:xfrm>
+              <a:prstGeom prst="rect">
+                <a:avLst/>
+              </a:prstGeom>
+            </p:spPr>
+          </p:pic>
+        </mc:Fallback>
+      </mc:AlternateContent>
+      <mc:AlternateContent xmlns:mc="http://schemas.openxmlformats.org/markup-compatibility/2006">
+        <mc:Choice xmlns:p14="http://schemas.microsoft.com/office/powerpoint/2010/main" Requires="p14">
+          <p:contentPart p14:bwMode="auto" r:id="rId13">
+            <p14:nvContentPartPr>
+              <p14:cNvPr id="13" name="Ink 12">
+                <a:extLst>
+                  <a:ext uri="{FF2B5EF4-FFF2-40B4-BE49-F238E27FC236}">
+                    <a16:creationId xmlns:a16="http://schemas.microsoft.com/office/drawing/2014/main" id="{BC4764DF-2008-4DE9-B128-B29774BD32F8}"/>
+                  </a:ext>
+                </a:extLst>
+              </p14:cNvPr>
+              <p14:cNvContentPartPr/>
+              <p14:nvPr/>
+            </p14:nvContentPartPr>
+            <p14:xfrm>
+              <a:off x="4740258" y="1230369"/>
+              <a:ext cx="360" cy="7200"/>
+            </p14:xfrm>
+          </p:contentPart>
+        </mc:Choice>
+        <mc:Fallback>
+          <p:pic>
+            <p:nvPicPr>
+              <p:cNvPr id="13" name="Ink 12">
+                <a:extLst>
+                  <a:ext uri="{FF2B5EF4-FFF2-40B4-BE49-F238E27FC236}">
+                    <a16:creationId xmlns:a16="http://schemas.microsoft.com/office/drawing/2014/main" id="{BC4764DF-2008-4DE9-B128-B29774BD32F8}"/>
+                  </a:ext>
+                </a:extLst>
+              </p:cNvPr>
+              <p:cNvPicPr/>
+              <p:nvPr/>
+            </p:nvPicPr>
+            <p:blipFill>
+              <a:blip r:embed="rId14"/>
+              <a:stretch>
+                <a:fillRect/>
+              </a:stretch>
+            </p:blipFill>
+            <p:spPr>
+              <a:xfrm>
+                <a:off x="4731258" y="1221729"/>
+                <a:ext cx="18000" cy="24840"/>
+              </a:xfrm>
+              <a:prstGeom prst="rect">
+                <a:avLst/>
+              </a:prstGeom>
+            </p:spPr>
+          </p:pic>
+        </mc:Fallback>
+      </mc:AlternateContent>
+      <mc:AlternateContent xmlns:mc="http://schemas.openxmlformats.org/markup-compatibility/2006">
+        <mc:Choice xmlns:p14="http://schemas.microsoft.com/office/powerpoint/2010/main" Requires="p14">
+          <p:contentPart p14:bwMode="auto" r:id="rId15">
+            <p14:nvContentPartPr>
+              <p14:cNvPr id="14" name="Ink 13">
+                <a:extLst>
+                  <a:ext uri="{FF2B5EF4-FFF2-40B4-BE49-F238E27FC236}">
+                    <a16:creationId xmlns:a16="http://schemas.microsoft.com/office/drawing/2014/main" id="{22D2016B-6FB2-47F5-A69D-4FEC6F2882DA}"/>
+                  </a:ext>
+                </a:extLst>
+              </p14:cNvPr>
+              <p14:cNvContentPartPr/>
+              <p14:nvPr/>
+            </p14:nvContentPartPr>
+            <p14:xfrm>
+              <a:off x="3574218" y="1240089"/>
+              <a:ext cx="6120" cy="4680"/>
+            </p14:xfrm>
+          </p:contentPart>
+        </mc:Choice>
+        <mc:Fallback>
+          <p:pic>
+            <p:nvPicPr>
+              <p:cNvPr id="14" name="Ink 13">
+                <a:extLst>
+                  <a:ext uri="{FF2B5EF4-FFF2-40B4-BE49-F238E27FC236}">
+                    <a16:creationId xmlns:a16="http://schemas.microsoft.com/office/drawing/2014/main" id="{22D2016B-6FB2-47F5-A69D-4FEC6F2882DA}"/>
+                  </a:ext>
+                </a:extLst>
+              </p:cNvPr>
+              <p:cNvPicPr/>
+              <p:nvPr/>
+            </p:nvPicPr>
+            <p:blipFill>
+              <a:blip r:embed="rId16"/>
+              <a:stretch>
+                <a:fillRect/>
+              </a:stretch>
+            </p:blipFill>
+            <p:spPr>
+              <a:xfrm>
+                <a:off x="3565578" y="1231449"/>
+                <a:ext cx="23760" cy="22320"/>
+              </a:xfrm>
+              <a:prstGeom prst="rect">
+                <a:avLst/>
+              </a:prstGeom>
+            </p:spPr>
+          </p:pic>
+        </mc:Fallback>
+      </mc:AlternateContent>
+      <mc:AlternateContent xmlns:mc="http://schemas.openxmlformats.org/markup-compatibility/2006">
+        <mc:Choice xmlns:p14="http://schemas.microsoft.com/office/powerpoint/2010/main" Requires="p14">
+          <p:contentPart p14:bwMode="auto" r:id="rId17">
+            <p14:nvContentPartPr>
+              <p14:cNvPr id="15" name="Ink 14">
+                <a:extLst>
+                  <a:ext uri="{FF2B5EF4-FFF2-40B4-BE49-F238E27FC236}">
+                    <a16:creationId xmlns:a16="http://schemas.microsoft.com/office/drawing/2014/main" id="{C997AF93-65B5-447C-A2D0-77F90DCD8ECA}"/>
+                  </a:ext>
+                </a:extLst>
+              </p14:cNvPr>
+              <p14:cNvContentPartPr/>
+              <p14:nvPr/>
+            </p14:nvContentPartPr>
+            <p14:xfrm>
+              <a:off x="5767338" y="4543449"/>
+              <a:ext cx="360" cy="360"/>
+            </p14:xfrm>
+          </p:contentPart>
+        </mc:Choice>
+        <mc:Fallback>
+          <p:pic>
+            <p:nvPicPr>
+              <p:cNvPr id="15" name="Ink 14">
+                <a:extLst>
+                  <a:ext uri="{FF2B5EF4-FFF2-40B4-BE49-F238E27FC236}">
+                    <a16:creationId xmlns:a16="http://schemas.microsoft.com/office/drawing/2014/main" id="{C997AF93-65B5-447C-A2D0-77F90DCD8ECA}"/>
+                  </a:ext>
+                </a:extLst>
+              </p:cNvPr>
+              <p:cNvPicPr/>
+              <p:nvPr/>
+            </p:nvPicPr>
+            <p:blipFill>
+              <a:blip r:embed="rId10"/>
+              <a:stretch>
+                <a:fillRect/>
+              </a:stretch>
+            </p:blipFill>
+            <p:spPr>
+              <a:xfrm>
+                <a:off x="5758698" y="4534809"/>
+                <a:ext cx="18000" cy="18000"/>
+              </a:xfrm>
+              <a:prstGeom prst="rect">
+                <a:avLst/>
+              </a:prstGeom>
+            </p:spPr>
+          </p:pic>
+        </mc:Fallback>
+      </mc:AlternateContent>
+      <mc:AlternateContent xmlns:mc="http://schemas.openxmlformats.org/markup-compatibility/2006">
+        <mc:Choice xmlns:p14="http://schemas.microsoft.com/office/powerpoint/2010/main" Requires="p14">
+          <p:contentPart p14:bwMode="auto" r:id="rId18">
+            <p14:nvContentPartPr>
+              <p14:cNvPr id="16" name="Ink 15">
+                <a:extLst>
+                  <a:ext uri="{FF2B5EF4-FFF2-40B4-BE49-F238E27FC236}">
+                    <a16:creationId xmlns:a16="http://schemas.microsoft.com/office/drawing/2014/main" id="{12990DF6-66E9-47F0-BDDF-84CD1F3EF419}"/>
+                  </a:ext>
+                </a:extLst>
+              </p14:cNvPr>
+              <p14:cNvContentPartPr/>
+              <p14:nvPr/>
+            </p14:nvContentPartPr>
+            <p14:xfrm>
+              <a:off x="4363338" y="1202289"/>
+              <a:ext cx="4680" cy="3240"/>
+            </p14:xfrm>
+          </p:contentPart>
+        </mc:Choice>
+        <mc:Fallback>
+          <p:pic>
+            <p:nvPicPr>
+              <p:cNvPr id="16" name="Ink 15">
+                <a:extLst>
+                  <a:ext uri="{FF2B5EF4-FFF2-40B4-BE49-F238E27FC236}">
+                    <a16:creationId xmlns:a16="http://schemas.microsoft.com/office/drawing/2014/main" id="{12990DF6-66E9-47F0-BDDF-84CD1F3EF419}"/>
+                  </a:ext>
+                </a:extLst>
+              </p:cNvPr>
+              <p:cNvPicPr/>
+              <p:nvPr/>
+            </p:nvPicPr>
+            <p:blipFill>
+              <a:blip r:embed="rId19"/>
+              <a:stretch>
+                <a:fillRect/>
+              </a:stretch>
+            </p:blipFill>
+            <p:spPr>
+              <a:xfrm>
+                <a:off x="4354338" y="1193649"/>
+                <a:ext cx="22320" cy="20880"/>
+              </a:xfrm>
+              <a:prstGeom prst="rect">
+                <a:avLst/>
+              </a:prstGeom>
+            </p:spPr>
+          </p:pic>
+        </mc:Fallback>
+      </mc:AlternateContent>
+      <mc:AlternateContent xmlns:mc="http://schemas.openxmlformats.org/markup-compatibility/2006">
+        <mc:Choice xmlns:p14="http://schemas.microsoft.com/office/powerpoint/2010/main" Requires="p14">
+          <p:contentPart p14:bwMode="auto" r:id="rId20">
+            <p14:nvContentPartPr>
+              <p14:cNvPr id="17" name="Ink 16">
+                <a:extLst>
+                  <a:ext uri="{FF2B5EF4-FFF2-40B4-BE49-F238E27FC236}">
+                    <a16:creationId xmlns:a16="http://schemas.microsoft.com/office/drawing/2014/main" id="{C942C315-ED9E-425F-A98E-F327DDD89128}"/>
+                  </a:ext>
+                </a:extLst>
+              </p14:cNvPr>
+              <p14:cNvContentPartPr/>
+              <p14:nvPr/>
+            </p14:nvContentPartPr>
+            <p14:xfrm>
+              <a:off x="3650178" y="1332969"/>
+              <a:ext cx="360" cy="3240"/>
+            </p14:xfrm>
+          </p:contentPart>
+        </mc:Choice>
+        <mc:Fallback>
+          <p:pic>
+            <p:nvPicPr>
+              <p:cNvPr id="17" name="Ink 16">
+                <a:extLst>
+                  <a:ext uri="{FF2B5EF4-FFF2-40B4-BE49-F238E27FC236}">
+                    <a16:creationId xmlns:a16="http://schemas.microsoft.com/office/drawing/2014/main" id="{C942C315-ED9E-425F-A98E-F327DDD89128}"/>
+                  </a:ext>
+                </a:extLst>
+              </p:cNvPr>
+              <p:cNvPicPr/>
+              <p:nvPr/>
+            </p:nvPicPr>
+            <p:blipFill>
+              <a:blip r:embed="rId8"/>
+              <a:stretch>
+                <a:fillRect/>
+              </a:stretch>
+            </p:blipFill>
+            <p:spPr>
+              <a:xfrm>
+                <a:off x="3641538" y="1324329"/>
+                <a:ext cx="18000" cy="20880"/>
+              </a:xfrm>
+              <a:prstGeom prst="rect">
+                <a:avLst/>
+              </a:prstGeom>
+            </p:spPr>
+          </p:pic>
+        </mc:Fallback>
+      </mc:AlternateContent>
       <p:pic>
         <p:nvPicPr>
-          <p:cNvPr id="4" name="Picture 3">
-            <a:extLst>
-              <a:ext uri="{FF2B5EF4-FFF2-40B4-BE49-F238E27FC236}">
-                <a16:creationId xmlns:a16="http://schemas.microsoft.com/office/drawing/2014/main" id="{26052F11-BE2E-4055-AE08-C24D4D0FED29}"/>
+          <p:cNvPr id="19" name="Picture 18">
+            <a:extLst>
+              <a:ext uri="{FF2B5EF4-FFF2-40B4-BE49-F238E27FC236}">
+                <a16:creationId xmlns:a16="http://schemas.microsoft.com/office/drawing/2014/main" id="{388BF81A-4AEE-42C3-AA06-85104DB14C9A}"/>
               </a:ext>
             </a:extLst>
           </p:cNvPr>
           <p:cNvPicPr>
-            <a:picLocks/>
+            <a:picLocks noChangeAspect="1"/>
           </p:cNvPicPr>
-          <p:nvPr/>
+          <p:nvPr>
+            <p:custDataLst>
+              <p:tags r:id="rId1"/>
+            </p:custDataLst>
+          </p:nvPr>
         </p:nvPicPr>
         <p:blipFill>
-          <a:blip r:embed="rId3"/>
+          <a:blip r:embed="rId21">
+            <a:extLst>
+              <a:ext uri="{28A0092B-C50C-407E-A947-70E740481C1C}">
+                <a14:useLocalDpi xmlns:a14="http://schemas.microsoft.com/office/drawing/2010/main" val="0"/>
+              </a:ext>
+            </a:extLst>
+          </a:blip>
           <a:stretch>
             <a:fillRect/>
           </a:stretch>
         </p:blipFill>
         <p:spPr>
           <a:xfrm flipH="1">
-            <a:off x="8371462" y="4231531"/>
-            <a:ext cx="1453475" cy="2626469"/>
+            <a:off x="2245595" y="2972124"/>
+            <a:ext cx="1474950" cy="3543422"/>
           </a:xfrm>
           <a:prstGeom prst="rect">
             <a:avLst/>
@@ -4026,91 +4809,82 @@
           <a:chExt cx="0" cy="0"/>
         </a:xfrm>
       </p:grpSpPr>
-      <p:sp>
-        <p:nvSpPr>
-          <p:cNvPr id="2" name="Title 1">
-            <a:extLst>
-              <a:ext uri="{FF2B5EF4-FFF2-40B4-BE49-F238E27FC236}">
-                <a16:creationId xmlns:a16="http://schemas.microsoft.com/office/drawing/2014/main" id="{1085419B-5605-44DB-AFF1-3D130D72CA00}"/>
-              </a:ext>
-            </a:extLst>
-          </p:cNvPr>
-          <p:cNvSpPr>
-            <a:spLocks noGrp="1"/>
-          </p:cNvSpPr>
-          <p:nvPr>
-            <p:ph type="title"/>
-          </p:nvPr>
-        </p:nvSpPr>
-        <p:spPr/>
-        <p:txBody>
-          <a:bodyPr>
-            <a:normAutofit/>
-          </a:bodyPr>
-          <a:lstStyle/>
-          <a:p>
-            <a:r>
-              <a:rPr lang="en-US" u="sng" dirty="0"/>
-              <a:t>To get the problem </a:t>
-            </a:r>
-            <a:r>
-              <a:rPr lang="en-US" dirty="0"/>
-              <a:t>type the address below into your computer browsers address bar:</a:t>
-            </a:r>
-          </a:p>
-        </p:txBody>
-      </p:sp>
-      <p:sp>
-        <p:nvSpPr>
-          <p:cNvPr id="3" name="Content Placeholder 2">
-            <a:extLst>
-              <a:ext uri="{FF2B5EF4-FFF2-40B4-BE49-F238E27FC236}">
-                <a16:creationId xmlns:a16="http://schemas.microsoft.com/office/drawing/2014/main" id="{30617AD4-26FB-47FF-B88E-AE74061E1FC7}"/>
-              </a:ext>
-            </a:extLst>
-          </p:cNvPr>
-          <p:cNvSpPr>
-            <a:spLocks noGrp="1"/>
-          </p:cNvSpPr>
-          <p:nvPr>
-            <p:ph idx="1"/>
-          </p:nvPr>
-        </p:nvSpPr>
-        <p:spPr/>
-        <p:txBody>
-          <a:bodyPr/>
-          <a:lstStyle/>
-          <a:p>
-            <a:pPr>
-              <a:lnSpc>
-                <a:spcPct val="200000"/>
-              </a:lnSpc>
-            </a:pPr>
-            <a:r>
-              <a:rPr lang="en-US" sz="4000" dirty="0">
-                <a:solidFill>
-                  <a:srgbClr val="FF0000"/>
-                </a:solidFill>
-              </a:rPr>
-              <a:t>qrhomework.org </a:t>
-            </a:r>
-          </a:p>
-          <a:p>
-            <a:endParaRPr lang="en-US" dirty="0"/>
-          </a:p>
-        </p:txBody>
-      </p:sp>
       <p:pic>
         <p:nvPicPr>
-          <p:cNvPr id="4" name="Picture 3">
-            <a:extLst>
-              <a:ext uri="{FF2B5EF4-FFF2-40B4-BE49-F238E27FC236}">
-                <a16:creationId xmlns:a16="http://schemas.microsoft.com/office/drawing/2014/main" id="{D62D796F-89CD-441F-AC7B-2DFC221BDBFF}"/>
+          <p:cNvPr id="10" name="Picture 9">
+            <a:extLst>
+              <a:ext uri="{FF2B5EF4-FFF2-40B4-BE49-F238E27FC236}">
+                <a16:creationId xmlns:a16="http://schemas.microsoft.com/office/drawing/2014/main" id="{DC809D0F-760D-40D6-A04E-ECB74258D59C}"/>
               </a:ext>
             </a:extLst>
           </p:cNvPr>
           <p:cNvPicPr>
             <a:picLocks noChangeAspect="1"/>
+          </p:cNvPicPr>
+          <p:nvPr/>
+        </p:nvPicPr>
+        <p:blipFill>
+          <a:blip r:embed="rId2"/>
+          <a:stretch>
+            <a:fillRect/>
+          </a:stretch>
+        </p:blipFill>
+        <p:spPr>
+          <a:xfrm>
+            <a:off x="5863173" y="313931"/>
+            <a:ext cx="5284725" cy="6230137"/>
+          </a:xfrm>
+          <a:prstGeom prst="rect">
+            <a:avLst/>
+          </a:prstGeom>
+        </p:spPr>
+      </p:pic>
+      <p:sp>
+        <p:nvSpPr>
+          <p:cNvPr id="11" name="TextBox 10">
+            <a:extLst>
+              <a:ext uri="{FF2B5EF4-FFF2-40B4-BE49-F238E27FC236}">
+                <a16:creationId xmlns:a16="http://schemas.microsoft.com/office/drawing/2014/main" id="{D50FB093-A485-4EB4-A9D2-5695B9A820CC}"/>
+              </a:ext>
+            </a:extLst>
+          </p:cNvPr>
+          <p:cNvSpPr txBox="1"/>
+          <p:nvPr/>
+        </p:nvSpPr>
+        <p:spPr>
+          <a:xfrm>
+            <a:off x="369651" y="661481"/>
+            <a:ext cx="4786008" cy="707886"/>
+          </a:xfrm>
+          <a:prstGeom prst="rect">
+            <a:avLst/>
+          </a:prstGeom>
+          <a:noFill/>
+        </p:spPr>
+        <p:txBody>
+          <a:bodyPr wrap="square" rtlCol="0">
+            <a:spAutoFit/>
+          </a:bodyPr>
+          <a:lstStyle/>
+          <a:p>
+            <a:r>
+              <a:rPr lang="en-US" sz="4000" dirty="0"/>
+              <a:t>Standard Sign in form </a:t>
+            </a:r>
+          </a:p>
+        </p:txBody>
+      </p:sp>
+      <p:pic>
+        <p:nvPicPr>
+          <p:cNvPr id="13" name="Picture 12">
+            <a:extLst>
+              <a:ext uri="{FF2B5EF4-FFF2-40B4-BE49-F238E27FC236}">
+                <a16:creationId xmlns:a16="http://schemas.microsoft.com/office/drawing/2014/main" id="{26DAD70B-1009-4DDF-BAAC-CF59BC9335D0}"/>
+              </a:ext>
+            </a:extLst>
+          </p:cNvPr>
+          <p:cNvPicPr>
+            <a:picLocks/>
           </p:cNvPicPr>
           <p:nvPr/>
         </p:nvPicPr>
@@ -4122,53 +4896,8 @@
         </p:blipFill>
         <p:spPr>
           <a:xfrm>
-            <a:off x="1643396" y="3323222"/>
-            <a:ext cx="6489222" cy="3169653"/>
-          </a:xfrm>
-          <a:prstGeom prst="rect">
-            <a:avLst/>
-          </a:prstGeom>
-          <a:ln>
-            <a:solidFill>
-              <a:schemeClr val="tx1"/>
-            </a:solidFill>
-          </a:ln>
-        </p:spPr>
-      </p:pic>
-      <p:pic>
-        <p:nvPicPr>
-          <p:cNvPr id="8" name="Picture 7">
-            <a:extLst>
-              <a:ext uri="{FF2B5EF4-FFF2-40B4-BE49-F238E27FC236}">
-                <a16:creationId xmlns:a16="http://schemas.microsoft.com/office/drawing/2014/main" id="{06A286AC-7051-4B35-A4E5-D12597C17347}"/>
-              </a:ext>
-            </a:extLst>
-          </p:cNvPr>
-          <p:cNvPicPr>
-            <a:picLocks noChangeAspect="1"/>
-          </p:cNvPicPr>
-          <p:nvPr>
-            <p:custDataLst>
-              <p:tags r:id="rId1"/>
-            </p:custDataLst>
-          </p:nvPr>
-        </p:nvPicPr>
-        <p:blipFill>
-          <a:blip r:embed="rId4">
-            <a:extLst>
-              <a:ext uri="{28A0092B-C50C-407E-A947-70E740481C1C}">
-                <a14:useLocalDpi xmlns:a14="http://schemas.microsoft.com/office/drawing/2010/main" val="0"/>
-              </a:ext>
-            </a:extLst>
-          </a:blip>
-          <a:stretch>
-            <a:fillRect/>
-          </a:stretch>
-        </p:blipFill>
-        <p:spPr>
-          <a:xfrm>
-            <a:off x="6096000" y="1560799"/>
-            <a:ext cx="1175354" cy="2823672"/>
+            <a:off x="1561767" y="1364975"/>
+            <a:ext cx="2095834" cy="5062329"/>
           </a:xfrm>
           <a:prstGeom prst="rect">
             <a:avLst/>
@@ -4191,6 +4920,14 @@
 <file path=ppt/slides/slide4.xml><?xml version="1.0" encoding="utf-8"?>
 <p:sld xmlns:a="http://schemas.openxmlformats.org/drawingml/2006/main" xmlns:r="http://schemas.openxmlformats.org/officeDocument/2006/relationships" xmlns:p="http://schemas.openxmlformats.org/presentationml/2006/main">
   <p:cSld>
+    <p:bg>
+      <p:bgPr>
+        <a:solidFill>
+          <a:schemeClr val="bg1"/>
+        </a:solidFill>
+        <a:effectLst/>
+      </p:bgPr>
+    </p:bg>
     <p:spTree>
       <p:nvGrpSpPr>
         <p:cNvPr id="1" name=""/>
@@ -4207,54 +4944,501 @@
       </p:grpSpPr>
       <p:sp>
         <p:nvSpPr>
-          <p:cNvPr id="2" name="Title 1">
-            <a:extLst>
-              <a:ext uri="{FF2B5EF4-FFF2-40B4-BE49-F238E27FC236}">
-                <a16:creationId xmlns:a16="http://schemas.microsoft.com/office/drawing/2014/main" id="{3867A6DF-3FB9-4B9B-90BF-4B4FAE3860C6}"/>
-              </a:ext>
-            </a:extLst>
-          </p:cNvPr>
-          <p:cNvSpPr>
-            <a:spLocks noGrp="1"/>
-          </p:cNvSpPr>
-          <p:nvPr>
-            <p:ph type="title"/>
+          <p:cNvPr id="12" name="Rectangle 11">
+            <a:extLst>
+              <a:ext uri="{FF2B5EF4-FFF2-40B4-BE49-F238E27FC236}">
+                <a16:creationId xmlns:a16="http://schemas.microsoft.com/office/drawing/2014/main" id="{F3060C83-F051-4F0E-ABAD-AA0DFC48B218}"/>
+              </a:ext>
+              <a:ext uri="{C183D7F6-B498-43B3-948B-1728B52AA6E4}">
+                <adec:decorative xmlns:adec="http://schemas.microsoft.com/office/drawing/2017/decorative" val="1"/>
+              </a:ext>
+            </a:extLst>
+          </p:cNvPr>
+          <p:cNvSpPr>
+            <a:spLocks noGrp="1" noRot="1" noChangeAspect="1" noMove="1" noResize="1" noEditPoints="1" noAdjustHandles="1" noChangeArrowheads="1" noChangeShapeType="1" noTextEdit="1"/>
+          </p:cNvSpPr>
+          <p:nvPr>
+            <p:extLst>
+              <p:ext uri="{386F3935-93C4-4BCD-93E2-E3B085C9AB24}">
+                <p16:designElem xmlns:p16="http://schemas.microsoft.com/office/powerpoint/2015/main" val="1"/>
+              </p:ext>
+            </p:extLst>
           </p:nvPr>
         </p:nvSpPr>
         <p:spPr>
           <a:xfrm>
-            <a:off x="838200" y="365126"/>
-            <a:ext cx="7580586" cy="315912"/>
+            <a:off x="0" y="0"/>
+            <a:ext cx="12192000" cy="6858000"/>
           </a:xfrm>
+          <a:prstGeom prst="rect">
+            <a:avLst/>
+          </a:prstGeom>
+          <a:solidFill>
+            <a:schemeClr val="bg1"/>
+          </a:solidFill>
+          <a:ln>
+            <a:noFill/>
+          </a:ln>
         </p:spPr>
-        <p:txBody>
-          <a:bodyPr>
-            <a:normAutofit/>
+        <p:style>
+          <a:lnRef idx="2">
+            <a:schemeClr val="accent1">
+              <a:shade val="50000"/>
+            </a:schemeClr>
+          </a:lnRef>
+          <a:fillRef idx="1">
+            <a:schemeClr val="accent1"/>
+          </a:fillRef>
+          <a:effectRef idx="0">
+            <a:schemeClr val="accent1"/>
+          </a:effectRef>
+          <a:fontRef idx="minor">
+            <a:schemeClr val="lt1"/>
+          </a:fontRef>
+        </p:style>
+        <p:txBody>
+          <a:bodyPr rtlCol="0" anchor="ctr"/>
+          <a:lstStyle/>
+          <a:p>
+            <a:pPr algn="ctr"/>
+            <a:endParaRPr lang="en-US" dirty="0"/>
+          </a:p>
+        </p:txBody>
+      </p:sp>
+      <p:sp>
+        <p:nvSpPr>
+          <p:cNvPr id="14" name="Freeform: Shape 13">
+            <a:extLst>
+              <a:ext uri="{FF2B5EF4-FFF2-40B4-BE49-F238E27FC236}">
+                <a16:creationId xmlns:a16="http://schemas.microsoft.com/office/drawing/2014/main" id="{83C98ABE-055B-441F-B07E-44F97F083C39}"/>
+              </a:ext>
+              <a:ext uri="{C183D7F6-B498-43B3-948B-1728B52AA6E4}">
+                <adec:decorative xmlns:adec="http://schemas.microsoft.com/office/drawing/2017/decorative" val="1"/>
+              </a:ext>
+            </a:extLst>
+          </p:cNvPr>
+          <p:cNvSpPr>
+            <a:spLocks noGrp="1" noRot="1" noChangeAspect="1" noMove="1" noResize="1" noEditPoints="1" noAdjustHandles="1" noChangeArrowheads="1" noChangeShapeType="1" noTextEdit="1"/>
+          </p:cNvSpPr>
+          <p:nvPr>
+            <p:extLst>
+              <p:ext uri="{386F3935-93C4-4BCD-93E2-E3B085C9AB24}">
+                <p16:designElem xmlns:p16="http://schemas.microsoft.com/office/powerpoint/2015/main" val="1"/>
+              </p:ext>
+            </p:extLst>
+          </p:nvPr>
+        </p:nvSpPr>
+        <p:spPr>
+          <a:xfrm rot="18900000" flipH="1">
+            <a:off x="-376156" y="-253670"/>
+            <a:ext cx="1827638" cy="1376989"/>
+          </a:xfrm>
+          <a:custGeom>
+            <a:avLst/>
+            <a:gdLst>
+              <a:gd name="connsiteX0" fmla="*/ 0 w 1827638"/>
+              <a:gd name="connsiteY0" fmla="*/ 987379 h 1376989"/>
+              <a:gd name="connsiteX1" fmla="*/ 987379 w 1827638"/>
+              <a:gd name="connsiteY1" fmla="*/ 0 h 1376989"/>
+              <a:gd name="connsiteX2" fmla="*/ 1827638 w 1827638"/>
+              <a:gd name="connsiteY2" fmla="*/ 840260 h 1376989"/>
+              <a:gd name="connsiteX3" fmla="*/ 1827638 w 1827638"/>
+              <a:gd name="connsiteY3" fmla="*/ 1376989 h 1376989"/>
+              <a:gd name="connsiteX4" fmla="*/ 0 w 1827638"/>
+              <a:gd name="connsiteY4" fmla="*/ 1376989 h 1376989"/>
+            </a:gdLst>
+            <a:ahLst/>
+            <a:cxnLst>
+              <a:cxn ang="0">
+                <a:pos x="connsiteX0" y="connsiteY0"/>
+              </a:cxn>
+              <a:cxn ang="0">
+                <a:pos x="connsiteX1" y="connsiteY1"/>
+              </a:cxn>
+              <a:cxn ang="0">
+                <a:pos x="connsiteX2" y="connsiteY2"/>
+              </a:cxn>
+              <a:cxn ang="0">
+                <a:pos x="connsiteX3" y="connsiteY3"/>
+              </a:cxn>
+              <a:cxn ang="0">
+                <a:pos x="connsiteX4" y="connsiteY4"/>
+              </a:cxn>
+            </a:cxnLst>
+            <a:rect l="l" t="t" r="r" b="b"/>
+            <a:pathLst>
+              <a:path w="1827638" h="1376989">
+                <a:moveTo>
+                  <a:pt x="0" y="987379"/>
+                </a:moveTo>
+                <a:lnTo>
+                  <a:pt x="987379" y="0"/>
+                </a:lnTo>
+                <a:lnTo>
+                  <a:pt x="1827638" y="840260"/>
+                </a:lnTo>
+                <a:lnTo>
+                  <a:pt x="1827638" y="1376989"/>
+                </a:lnTo>
+                <a:lnTo>
+                  <a:pt x="0" y="1376989"/>
+                </a:lnTo>
+                <a:close/>
+              </a:path>
+            </a:pathLst>
+          </a:custGeom>
+          <a:solidFill>
+            <a:schemeClr val="accent1">
+              <a:alpha val="30000"/>
+            </a:schemeClr>
+          </a:solidFill>
+          <a:ln>
+            <a:noFill/>
+          </a:ln>
+        </p:spPr>
+        <p:style>
+          <a:lnRef idx="2">
+            <a:schemeClr val="accent1">
+              <a:shade val="50000"/>
+            </a:schemeClr>
+          </a:lnRef>
+          <a:fillRef idx="1">
+            <a:schemeClr val="accent1"/>
+          </a:fillRef>
+          <a:effectRef idx="0">
+            <a:schemeClr val="accent1"/>
+          </a:effectRef>
+          <a:fontRef idx="minor">
+            <a:schemeClr val="lt1"/>
+          </a:fontRef>
+        </p:style>
+        <p:txBody>
+          <a:bodyPr rtlCol="0" anchor="ctr"/>
+          <a:lstStyle/>
+          <a:p>
+            <a:pPr algn="ctr"/>
+            <a:endParaRPr lang="en-US" dirty="0"/>
+          </a:p>
+        </p:txBody>
+      </p:sp>
+      <p:sp>
+        <p:nvSpPr>
+          <p:cNvPr id="16" name="Rectangle 15">
+            <a:extLst>
+              <a:ext uri="{FF2B5EF4-FFF2-40B4-BE49-F238E27FC236}">
+                <a16:creationId xmlns:a16="http://schemas.microsoft.com/office/drawing/2014/main" id="{29FDB030-9B49-4CED-8CCD-4D99382388AC}"/>
+              </a:ext>
+              <a:ext uri="{C183D7F6-B498-43B3-948B-1728B52AA6E4}">
+                <adec:decorative xmlns:adec="http://schemas.microsoft.com/office/drawing/2017/decorative" val="1"/>
+              </a:ext>
+            </a:extLst>
+          </p:cNvPr>
+          <p:cNvSpPr>
+            <a:spLocks noGrp="1" noRot="1" noChangeAspect="1" noMove="1" noResize="1" noEditPoints="1" noAdjustHandles="1" noChangeArrowheads="1" noChangeShapeType="1" noTextEdit="1"/>
+          </p:cNvSpPr>
+          <p:nvPr>
+            <p:extLst>
+              <p:ext uri="{386F3935-93C4-4BCD-93E2-E3B085C9AB24}">
+                <p16:designElem xmlns:p16="http://schemas.microsoft.com/office/powerpoint/2015/main" val="1"/>
+              </p:ext>
+            </p:extLst>
+          </p:nvPr>
+        </p:nvSpPr>
+        <p:spPr>
+          <a:xfrm rot="18900000" flipH="1">
+            <a:off x="891641" y="422146"/>
+            <a:ext cx="645368" cy="645368"/>
+          </a:xfrm>
+          <a:prstGeom prst="rect">
+            <a:avLst/>
+          </a:prstGeom>
+          <a:solidFill>
+            <a:schemeClr val="accent1">
+              <a:alpha val="30000"/>
+            </a:schemeClr>
+          </a:solidFill>
+          <a:ln>
+            <a:noFill/>
+          </a:ln>
+        </p:spPr>
+        <p:style>
+          <a:lnRef idx="2">
+            <a:schemeClr val="accent1">
+              <a:shade val="50000"/>
+            </a:schemeClr>
+          </a:lnRef>
+          <a:fillRef idx="1">
+            <a:schemeClr val="accent1"/>
+          </a:fillRef>
+          <a:effectRef idx="0">
+            <a:schemeClr val="accent1"/>
+          </a:effectRef>
+          <a:fontRef idx="minor">
+            <a:schemeClr val="lt1"/>
+          </a:fontRef>
+        </p:style>
+        <p:txBody>
+          <a:bodyPr rtlCol="0" anchor="ctr"/>
+          <a:lstStyle/>
+          <a:p>
+            <a:pPr algn="ctr"/>
+            <a:endParaRPr lang="en-US"/>
+          </a:p>
+        </p:txBody>
+      </p:sp>
+      <p:sp>
+        <p:nvSpPr>
+          <p:cNvPr id="18" name="Rectangle 17">
+            <a:extLst>
+              <a:ext uri="{FF2B5EF4-FFF2-40B4-BE49-F238E27FC236}">
+                <a16:creationId xmlns:a16="http://schemas.microsoft.com/office/drawing/2014/main" id="{3783CA14-24A1-485C-8B30-D6A5D87987AD}"/>
+              </a:ext>
+              <a:ext uri="{C183D7F6-B498-43B3-948B-1728B52AA6E4}">
+                <adec:decorative xmlns:adec="http://schemas.microsoft.com/office/drawing/2017/decorative" val="1"/>
+              </a:ext>
+            </a:extLst>
+          </p:cNvPr>
+          <p:cNvSpPr>
+            <a:spLocks noGrp="1" noRot="1" noChangeAspect="1" noMove="1" noResize="1" noEditPoints="1" noAdjustHandles="1" noChangeArrowheads="1" noChangeShapeType="1" noTextEdit="1"/>
+          </p:cNvSpPr>
+          <p:nvPr>
+            <p:extLst>
+              <p:ext uri="{386F3935-93C4-4BCD-93E2-E3B085C9AB24}">
+                <p16:designElem xmlns:p16="http://schemas.microsoft.com/office/powerpoint/2015/main" val="1"/>
+              </p:ext>
+            </p:extLst>
+          </p:nvPr>
+        </p:nvSpPr>
+        <p:spPr>
+          <a:xfrm rot="18900000" flipH="1">
+            <a:off x="10043482" y="655140"/>
+            <a:ext cx="687472" cy="687472"/>
+          </a:xfrm>
+          <a:prstGeom prst="rect">
+            <a:avLst/>
+          </a:prstGeom>
+          <a:solidFill>
+            <a:schemeClr val="accent4">
+              <a:alpha val="30000"/>
+            </a:schemeClr>
+          </a:solidFill>
+          <a:ln>
+            <a:noFill/>
+          </a:ln>
+        </p:spPr>
+        <p:style>
+          <a:lnRef idx="2">
+            <a:schemeClr val="accent1">
+              <a:shade val="50000"/>
+            </a:schemeClr>
+          </a:lnRef>
+          <a:fillRef idx="1">
+            <a:schemeClr val="accent1"/>
+          </a:fillRef>
+          <a:effectRef idx="0">
+            <a:schemeClr val="accent1"/>
+          </a:effectRef>
+          <a:fontRef idx="minor">
+            <a:schemeClr val="lt1"/>
+          </a:fontRef>
+        </p:style>
+        <p:txBody>
+          <a:bodyPr rtlCol="0" anchor="ctr"/>
+          <a:lstStyle/>
+          <a:p>
+            <a:pPr algn="ctr"/>
+            <a:endParaRPr lang="en-US"/>
+          </a:p>
+        </p:txBody>
+      </p:sp>
+      <p:sp>
+        <p:nvSpPr>
+          <p:cNvPr id="20" name="Freeform: Shape 19">
+            <a:extLst>
+              <a:ext uri="{FF2B5EF4-FFF2-40B4-BE49-F238E27FC236}">
+                <a16:creationId xmlns:a16="http://schemas.microsoft.com/office/drawing/2014/main" id="{9A97C86A-04D6-40F7-AE84-31AB43E6A846}"/>
+              </a:ext>
+              <a:ext uri="{C183D7F6-B498-43B3-948B-1728B52AA6E4}">
+                <adec:decorative xmlns:adec="http://schemas.microsoft.com/office/drawing/2017/decorative" val="1"/>
+              </a:ext>
+            </a:extLst>
+          </p:cNvPr>
+          <p:cNvSpPr>
+            <a:spLocks noGrp="1" noRot="1" noChangeAspect="1" noMove="1" noResize="1" noEditPoints="1" noAdjustHandles="1" noChangeArrowheads="1" noChangeShapeType="1" noTextEdit="1"/>
+          </p:cNvSpPr>
+          <p:nvPr>
+            <p:extLst>
+              <p:ext uri="{386F3935-93C4-4BCD-93E2-E3B085C9AB24}">
+                <p16:designElem xmlns:p16="http://schemas.microsoft.com/office/powerpoint/2015/main" val="1"/>
+              </p:ext>
+            </p:extLst>
+          </p:nvPr>
+        </p:nvSpPr>
+        <p:spPr>
+          <a:xfrm rot="10800000" flipH="1">
+            <a:off x="9356643" y="0"/>
+            <a:ext cx="2835357" cy="1480837"/>
+          </a:xfrm>
+          <a:custGeom>
+            <a:avLst/>
+            <a:gdLst>
+              <a:gd name="connsiteX0" fmla="*/ 2835357 w 2835357"/>
+              <a:gd name="connsiteY0" fmla="*/ 1480837 h 1480837"/>
+              <a:gd name="connsiteX1" fmla="*/ 0 w 2835357"/>
+              <a:gd name="connsiteY1" fmla="*/ 1480837 h 1480837"/>
+              <a:gd name="connsiteX2" fmla="*/ 1552727 w 2835357"/>
+              <a:gd name="connsiteY2" fmla="*/ 0 h 1480837"/>
+              <a:gd name="connsiteX3" fmla="*/ 2835357 w 2835357"/>
+              <a:gd name="connsiteY3" fmla="*/ 1223245 h 1480837"/>
+            </a:gdLst>
+            <a:ahLst/>
+            <a:cxnLst>
+              <a:cxn ang="0">
+                <a:pos x="connsiteX0" y="connsiteY0"/>
+              </a:cxn>
+              <a:cxn ang="0">
+                <a:pos x="connsiteX1" y="connsiteY1"/>
+              </a:cxn>
+              <a:cxn ang="0">
+                <a:pos x="connsiteX2" y="connsiteY2"/>
+              </a:cxn>
+              <a:cxn ang="0">
+                <a:pos x="connsiteX3" y="connsiteY3"/>
+              </a:cxn>
+            </a:cxnLst>
+            <a:rect l="l" t="t" r="r" b="b"/>
+            <a:pathLst>
+              <a:path w="2835357" h="1480837">
+                <a:moveTo>
+                  <a:pt x="2835357" y="1480837"/>
+                </a:moveTo>
+                <a:lnTo>
+                  <a:pt x="0" y="1480837"/>
+                </a:lnTo>
+                <a:lnTo>
+                  <a:pt x="1552727" y="0"/>
+                </a:lnTo>
+                <a:lnTo>
+                  <a:pt x="2835357" y="1223245"/>
+                </a:lnTo>
+                <a:close/>
+              </a:path>
+            </a:pathLst>
+          </a:custGeom>
+          <a:solidFill>
+            <a:schemeClr val="accent4">
+              <a:alpha val="30000"/>
+            </a:schemeClr>
+          </a:solidFill>
+          <a:ln>
+            <a:noFill/>
+          </a:ln>
+        </p:spPr>
+        <p:style>
+          <a:lnRef idx="2">
+            <a:schemeClr val="accent1">
+              <a:shade val="50000"/>
+            </a:schemeClr>
+          </a:lnRef>
+          <a:fillRef idx="1">
+            <a:schemeClr val="accent1"/>
+          </a:fillRef>
+          <a:effectRef idx="0">
+            <a:schemeClr val="accent1"/>
+          </a:effectRef>
+          <a:fontRef idx="minor">
+            <a:schemeClr val="lt1"/>
+          </a:fontRef>
+        </p:style>
+        <p:txBody>
+          <a:bodyPr wrap="square" rtlCol="0" anchor="ctr">
+            <a:noAutofit/>
           </a:bodyPr>
           <a:lstStyle/>
           <a:p>
-            <a:r>
-              <a:rPr lang="en-US" sz="1600" b="1" dirty="0"/>
-              <a:t>You should get your problem:</a:t>
-            </a:r>
+            <a:pPr algn="ctr"/>
+            <a:endParaRPr lang="en-US" dirty="0"/>
+          </a:p>
+        </p:txBody>
+      </p:sp>
+      <p:sp>
+        <p:nvSpPr>
+          <p:cNvPr id="22" name="Isosceles Triangle 21">
+            <a:extLst>
+              <a:ext uri="{FF2B5EF4-FFF2-40B4-BE49-F238E27FC236}">
+                <a16:creationId xmlns:a16="http://schemas.microsoft.com/office/drawing/2014/main" id="{FF9F2414-84E8-453E-B1F3-389FDE8192D9}"/>
+              </a:ext>
+              <a:ext uri="{C183D7F6-B498-43B3-948B-1728B52AA6E4}">
+                <adec:decorative xmlns:adec="http://schemas.microsoft.com/office/drawing/2017/decorative" val="1"/>
+              </a:ext>
+            </a:extLst>
+          </p:cNvPr>
+          <p:cNvSpPr>
+            <a:spLocks noGrp="1" noRot="1" noChangeAspect="1" noMove="1" noResize="1" noEditPoints="1" noAdjustHandles="1" noChangeArrowheads="1" noChangeShapeType="1" noTextEdit="1"/>
+          </p:cNvSpPr>
+          <p:nvPr>
+            <p:extLst>
+              <p:ext uri="{386F3935-93C4-4BCD-93E2-E3B085C9AB24}">
+                <p16:designElem xmlns:p16="http://schemas.microsoft.com/office/powerpoint/2015/main" val="1"/>
+              </p:ext>
+            </p:extLst>
+          </p:nvPr>
+        </p:nvSpPr>
+        <p:spPr>
+          <a:xfrm flipH="1">
+            <a:off x="7976344" y="6115501"/>
+            <a:ext cx="1494513" cy="742499"/>
+          </a:xfrm>
+          <a:prstGeom prst="triangle">
+            <a:avLst/>
+          </a:prstGeom>
+          <a:solidFill>
+            <a:schemeClr val="accent1">
+              <a:alpha val="30000"/>
+            </a:schemeClr>
+          </a:solidFill>
+          <a:ln>
+            <a:noFill/>
+          </a:ln>
+        </p:spPr>
+        <p:style>
+          <a:lnRef idx="2">
+            <a:schemeClr val="accent1">
+              <a:shade val="50000"/>
+            </a:schemeClr>
+          </a:lnRef>
+          <a:fillRef idx="1">
+            <a:schemeClr val="accent1"/>
+          </a:fillRef>
+          <a:effectRef idx="0">
+            <a:schemeClr val="accent1"/>
+          </a:effectRef>
+          <a:fontRef idx="minor">
+            <a:schemeClr val="lt1"/>
+          </a:fontRef>
+        </p:style>
+        <p:txBody>
+          <a:bodyPr rtlCol="0" anchor="ctr"/>
+          <a:lstStyle/>
+          <a:p>
+            <a:pPr algn="ctr"/>
+            <a:endParaRPr lang="en-US"/>
           </a:p>
         </p:txBody>
       </p:sp>
       <p:pic>
         <p:nvPicPr>
-          <p:cNvPr id="10" name="Content Placeholder 9">
-            <a:extLst>
-              <a:ext uri="{FF2B5EF4-FFF2-40B4-BE49-F238E27FC236}">
-                <a16:creationId xmlns:a16="http://schemas.microsoft.com/office/drawing/2014/main" id="{B2335A03-E9DE-456F-9143-707C4573C8BF}"/>
+          <p:cNvPr id="7" name="Picture 6">
+            <a:extLst>
+              <a:ext uri="{FF2B5EF4-FFF2-40B4-BE49-F238E27FC236}">
+                <a16:creationId xmlns:a16="http://schemas.microsoft.com/office/drawing/2014/main" id="{909AAC0E-6638-4799-91D9-73FDF52EF0C4}"/>
               </a:ext>
             </a:extLst>
           </p:cNvPr>
           <p:cNvPicPr>
-            <a:picLocks noGrp="1" noChangeAspect="1"/>
+            <a:picLocks noChangeAspect="1"/>
           </p:cNvPicPr>
-          <p:nvPr>
-            <p:ph idx="1"/>
-          </p:nvPr>
+          <p:nvPr/>
         </p:nvPicPr>
         <p:blipFill>
           <a:blip r:embed="rId2"/>
@@ -4264,8 +5448,106 @@
         </p:blipFill>
         <p:spPr>
           <a:xfrm>
-            <a:off x="772886" y="861141"/>
-            <a:ext cx="9971314" cy="2912303"/>
+            <a:off x="4712509" y="1612596"/>
+            <a:ext cx="7412948" cy="4818416"/>
+          </a:xfrm>
+          <a:prstGeom prst="rect">
+            <a:avLst/>
+          </a:prstGeom>
+          <a:ln>
+            <a:noFill/>
+          </a:ln>
+        </p:spPr>
+      </p:pic>
+      <p:sp>
+        <p:nvSpPr>
+          <p:cNvPr id="24" name="Isosceles Triangle 23">
+            <a:extLst>
+              <a:ext uri="{FF2B5EF4-FFF2-40B4-BE49-F238E27FC236}">
+                <a16:creationId xmlns:a16="http://schemas.microsoft.com/office/drawing/2014/main" id="{3ECA69A1-7536-43AC-85EF-C7106179F5ED}"/>
+              </a:ext>
+              <a:ext uri="{C183D7F6-B498-43B3-948B-1728B52AA6E4}">
+                <adec:decorative xmlns:adec="http://schemas.microsoft.com/office/drawing/2017/decorative" val="1"/>
+              </a:ext>
+            </a:extLst>
+          </p:cNvPr>
+          <p:cNvSpPr>
+            <a:spLocks noGrp="1" noRot="1" noChangeAspect="1" noMove="1" noResize="1" noEditPoints="1" noAdjustHandles="1" noChangeArrowheads="1" noChangeShapeType="1" noTextEdit="1"/>
+          </p:cNvSpPr>
+          <p:nvPr>
+            <p:extLst>
+              <p:ext uri="{386F3935-93C4-4BCD-93E2-E3B085C9AB24}">
+                <p16:designElem xmlns:p16="http://schemas.microsoft.com/office/powerpoint/2015/main" val="1"/>
+              </p:ext>
+            </p:extLst>
+          </p:nvPr>
+        </p:nvSpPr>
+        <p:spPr>
+          <a:xfrm flipH="1">
+            <a:off x="7604080" y="6453143"/>
+            <a:ext cx="814903" cy="404857"/>
+          </a:xfrm>
+          <a:prstGeom prst="triangle">
+            <a:avLst/>
+          </a:prstGeom>
+          <a:solidFill>
+            <a:schemeClr val="accent1">
+              <a:alpha val="30000"/>
+            </a:schemeClr>
+          </a:solidFill>
+          <a:ln>
+            <a:noFill/>
+          </a:ln>
+        </p:spPr>
+        <p:style>
+          <a:lnRef idx="2">
+            <a:schemeClr val="accent1">
+              <a:shade val="50000"/>
+            </a:schemeClr>
+          </a:lnRef>
+          <a:fillRef idx="1">
+            <a:schemeClr val="accent1"/>
+          </a:fillRef>
+          <a:effectRef idx="0">
+            <a:schemeClr val="accent1"/>
+          </a:effectRef>
+          <a:fontRef idx="minor">
+            <a:schemeClr val="lt1"/>
+          </a:fontRef>
+        </p:style>
+        <p:txBody>
+          <a:bodyPr rtlCol="0" anchor="ctr"/>
+          <a:lstStyle/>
+          <a:p>
+            <a:pPr algn="ctr"/>
+            <a:endParaRPr lang="en-US"/>
+          </a:p>
+        </p:txBody>
+      </p:sp>
+      <p:pic>
+        <p:nvPicPr>
+          <p:cNvPr id="9" name="Picture 8">
+            <a:extLst>
+              <a:ext uri="{FF2B5EF4-FFF2-40B4-BE49-F238E27FC236}">
+                <a16:creationId xmlns:a16="http://schemas.microsoft.com/office/drawing/2014/main" id="{72AF8FA3-9CBB-47E2-811F-333A56FD3E02}"/>
+              </a:ext>
+            </a:extLst>
+          </p:cNvPr>
+          <p:cNvPicPr>
+            <a:picLocks/>
+          </p:cNvPicPr>
+          <p:nvPr/>
+        </p:nvPicPr>
+        <p:blipFill>
+          <a:blip r:embed="rId3"/>
+          <a:stretch>
+            <a:fillRect/>
+          </a:stretch>
+        </p:blipFill>
+        <p:spPr>
+          <a:xfrm>
+            <a:off x="888243" y="512758"/>
+            <a:ext cx="2505602" cy="5762145"/>
           </a:xfrm>
           <a:prstGeom prst="rect">
             <a:avLst/>
@@ -4304,19 +5586,17 @@
       </p:grpSpPr>
       <p:pic>
         <p:nvPicPr>
-          <p:cNvPr id="6" name="Content Placeholder 5">
-            <a:extLst>
-              <a:ext uri="{FF2B5EF4-FFF2-40B4-BE49-F238E27FC236}">
-                <a16:creationId xmlns:a16="http://schemas.microsoft.com/office/drawing/2014/main" id="{0ED193FD-CE5F-43BB-B85B-61A5EF7D7AEF}"/>
+          <p:cNvPr id="4" name="Picture 3">
+            <a:extLst>
+              <a:ext uri="{FF2B5EF4-FFF2-40B4-BE49-F238E27FC236}">
+                <a16:creationId xmlns:a16="http://schemas.microsoft.com/office/drawing/2014/main" id="{E1613908-F60C-4738-8394-4A6C6C630394}"/>
               </a:ext>
             </a:extLst>
           </p:cNvPr>
           <p:cNvPicPr>
-            <a:picLocks noGrp="1" noChangeAspect="1"/>
+            <a:picLocks noChangeAspect="1"/>
           </p:cNvPicPr>
-          <p:nvPr>
-            <p:ph idx="1"/>
-          </p:nvPr>
+          <p:nvPr/>
         </p:nvPicPr>
         <p:blipFill>
           <a:blip r:embed="rId2"/>
@@ -4326,8 +5606,8 @@
         </p:blipFill>
         <p:spPr>
           <a:xfrm>
-            <a:off x="312683" y="878494"/>
-            <a:ext cx="9955924" cy="5101012"/>
+            <a:off x="5168349" y="1185078"/>
+            <a:ext cx="5680641" cy="5175965"/>
           </a:xfrm>
           <a:prstGeom prst="rect">
             <a:avLst/>
@@ -4336,69 +5616,20 @@
       </p:pic>
       <p:sp>
         <p:nvSpPr>
-          <p:cNvPr id="8" name="Right Brace 7">
-            <a:extLst>
-              <a:ext uri="{FF2B5EF4-FFF2-40B4-BE49-F238E27FC236}">
-                <a16:creationId xmlns:a16="http://schemas.microsoft.com/office/drawing/2014/main" id="{C0FC57C2-7FC9-4896-B684-2E25A8B6F593}"/>
-              </a:ext>
-            </a:extLst>
-          </p:cNvPr>
-          <p:cNvSpPr/>
+          <p:cNvPr id="5" name="TextBox 4">
+            <a:extLst>
+              <a:ext uri="{FF2B5EF4-FFF2-40B4-BE49-F238E27FC236}">
+                <a16:creationId xmlns:a16="http://schemas.microsoft.com/office/drawing/2014/main" id="{4C10B9FC-BFB6-4775-9B4B-39B4557CF601}"/>
+              </a:ext>
+            </a:extLst>
+          </p:cNvPr>
+          <p:cNvSpPr txBox="1"/>
           <p:nvPr/>
         </p:nvSpPr>
         <p:spPr>
           <a:xfrm>
-            <a:off x="9921766" y="878494"/>
-            <a:ext cx="861848" cy="5354140"/>
-          </a:xfrm>
-          <a:prstGeom prst="rightBrace">
-            <a:avLst/>
-          </a:prstGeom>
-          <a:ln>
-            <a:solidFill>
-              <a:srgbClr val="FF0000"/>
-            </a:solidFill>
-          </a:ln>
-        </p:spPr>
-        <p:style>
-          <a:lnRef idx="1">
-            <a:schemeClr val="accent1"/>
-          </a:lnRef>
-          <a:fillRef idx="0">
-            <a:schemeClr val="accent1"/>
-          </a:fillRef>
-          <a:effectRef idx="0">
-            <a:schemeClr val="accent1"/>
-          </a:effectRef>
-          <a:fontRef idx="minor">
-            <a:schemeClr val="tx1"/>
-          </a:fontRef>
-        </p:style>
-        <p:txBody>
-          <a:bodyPr rtlCol="0" anchor="ctr"/>
-          <a:lstStyle/>
-          <a:p>
-            <a:pPr algn="ctr"/>
-            <a:endParaRPr lang="en-US"/>
-          </a:p>
-        </p:txBody>
-      </p:sp>
-      <p:sp>
-        <p:nvSpPr>
-          <p:cNvPr id="9" name="TextBox 8">
-            <a:extLst>
-              <a:ext uri="{FF2B5EF4-FFF2-40B4-BE49-F238E27FC236}">
-                <a16:creationId xmlns:a16="http://schemas.microsoft.com/office/drawing/2014/main" id="{608DC123-0B79-401A-B6CC-6276A26BD360}"/>
-              </a:ext>
-            </a:extLst>
-          </p:cNvPr>
-          <p:cNvSpPr txBox="1"/>
-          <p:nvPr/>
-        </p:nvSpPr>
-        <p:spPr>
-          <a:xfrm>
-            <a:off x="10783613" y="2385737"/>
-            <a:ext cx="1095703" cy="2585323"/>
+            <a:off x="675861" y="6016487"/>
+            <a:ext cx="4206023" cy="646331"/>
           </a:xfrm>
           <a:prstGeom prst="rect">
             <a:avLst/>
@@ -4406,22 +5637,55 @@
           <a:noFill/>
         </p:spPr>
         <p:txBody>
-          <a:bodyPr wrap="square" rtlCol="0">
+          <a:bodyPr wrap="none" rtlCol="0">
             <a:spAutoFit/>
           </a:bodyPr>
           <a:lstStyle/>
           <a:p>
             <a:r>
-              <a:rPr lang="en-US" dirty="0">
-                <a:solidFill>
-                  <a:srgbClr val="FF0000"/>
-                </a:solidFill>
-              </a:rPr>
-              <a:t>Your instructor may have assigned some of these reflection questions too</a:t>
-            </a:r>
-          </a:p>
-        </p:txBody>
-      </p:sp>
+              <a:rPr lang="en-US" dirty="0"/>
+              <a:t>Only if you have more  than one class with </a:t>
+            </a:r>
+          </a:p>
+          <a:p>
+            <a:r>
+              <a:rPr lang="en-US" dirty="0" err="1"/>
+              <a:t>QRhomeowrk</a:t>
+            </a:r>
+            <a:endParaRPr lang="en-US" dirty="0"/>
+          </a:p>
+        </p:txBody>
+      </p:sp>
+      <p:pic>
+        <p:nvPicPr>
+          <p:cNvPr id="7" name="Picture 6">
+            <a:extLst>
+              <a:ext uri="{FF2B5EF4-FFF2-40B4-BE49-F238E27FC236}">
+                <a16:creationId xmlns:a16="http://schemas.microsoft.com/office/drawing/2014/main" id="{BBE0B382-304D-4998-A1E3-C6D0C7C08E58}"/>
+              </a:ext>
+            </a:extLst>
+          </p:cNvPr>
+          <p:cNvPicPr>
+            <a:picLocks/>
+          </p:cNvPicPr>
+          <p:nvPr/>
+        </p:nvPicPr>
+        <p:blipFill>
+          <a:blip r:embed="rId3"/>
+          <a:stretch>
+            <a:fillRect/>
+          </a:stretch>
+        </p:blipFill>
+        <p:spPr>
+          <a:xfrm>
+            <a:off x="2628899" y="1760386"/>
+            <a:ext cx="1532283" cy="4025348"/>
+          </a:xfrm>
+          <a:prstGeom prst="rect">
+            <a:avLst/>
+          </a:prstGeom>
+        </p:spPr>
+      </p:pic>
     </p:spTree>
     <p:extLst>
       <p:ext uri="{BB962C8B-B14F-4D97-AF65-F5344CB8AC3E}">
@@ -5787,7 +7051,7 @@
 
 <file path=ppt/webextensions/taskpanes.xml><?xml version="1.0" encoding="utf-8"?>
 <wetp:taskpanes xmlns:wetp="http://schemas.microsoft.com/office/webextensions/taskpanes/2010/11">
-  <wetp:taskpane dockstate="right" visibility="0" width="350" row="7">
+  <wetp:taskpane dockstate="right" visibility="0" width="977" row="9">
     <wetp:webextensionref xmlns:r="http://schemas.openxmlformats.org/officeDocument/2006/relationships" r:id="rId1"/>
   </wetp:taskpane>
 </wetp:taskpanes>

</xml_diff>